<commit_message>
Added equations for vehicle and environment
</commit_message>
<xml_diff>
--- a/Block_Diagram.pptx
+++ b/Block_Diagram.pptx
@@ -290,7 +290,7 @@
           <a:p>
             <a:fld id="{5CFEE199-47E7-4EA7-AFBD-8A4F6CCA5D88}" type="datetimeFigureOut">
               <a:rPr lang="en-US" smtClean="0"/>
-              <a:t>10/9/2014</a:t>
+              <a:t>10/16/2014</a:t>
             </a:fld>
             <a:endParaRPr lang="en-US"/>
           </a:p>
@@ -460,7 +460,7 @@
           <a:p>
             <a:fld id="{5CFEE199-47E7-4EA7-AFBD-8A4F6CCA5D88}" type="datetimeFigureOut">
               <a:rPr lang="en-US" smtClean="0"/>
-              <a:t>10/9/2014</a:t>
+              <a:t>10/16/2014</a:t>
             </a:fld>
             <a:endParaRPr lang="en-US"/>
           </a:p>
@@ -640,7 +640,7 @@
           <a:p>
             <a:fld id="{5CFEE199-47E7-4EA7-AFBD-8A4F6CCA5D88}" type="datetimeFigureOut">
               <a:rPr lang="en-US" smtClean="0"/>
-              <a:t>10/9/2014</a:t>
+              <a:t>10/16/2014</a:t>
             </a:fld>
             <a:endParaRPr lang="en-US"/>
           </a:p>
@@ -810,7 +810,7 @@
           <a:p>
             <a:fld id="{5CFEE199-47E7-4EA7-AFBD-8A4F6CCA5D88}" type="datetimeFigureOut">
               <a:rPr lang="en-US" smtClean="0"/>
-              <a:t>10/9/2014</a:t>
+              <a:t>10/16/2014</a:t>
             </a:fld>
             <a:endParaRPr lang="en-US"/>
           </a:p>
@@ -1056,7 +1056,7 @@
           <a:p>
             <a:fld id="{5CFEE199-47E7-4EA7-AFBD-8A4F6CCA5D88}" type="datetimeFigureOut">
               <a:rPr lang="en-US" smtClean="0"/>
-              <a:t>10/9/2014</a:t>
+              <a:t>10/16/2014</a:t>
             </a:fld>
             <a:endParaRPr lang="en-US"/>
           </a:p>
@@ -1344,7 +1344,7 @@
           <a:p>
             <a:fld id="{5CFEE199-47E7-4EA7-AFBD-8A4F6CCA5D88}" type="datetimeFigureOut">
               <a:rPr lang="en-US" smtClean="0"/>
-              <a:t>10/9/2014</a:t>
+              <a:t>10/16/2014</a:t>
             </a:fld>
             <a:endParaRPr lang="en-US"/>
           </a:p>
@@ -1766,7 +1766,7 @@
           <a:p>
             <a:fld id="{5CFEE199-47E7-4EA7-AFBD-8A4F6CCA5D88}" type="datetimeFigureOut">
               <a:rPr lang="en-US" smtClean="0"/>
-              <a:t>10/9/2014</a:t>
+              <a:t>10/16/2014</a:t>
             </a:fld>
             <a:endParaRPr lang="en-US"/>
           </a:p>
@@ -1884,7 +1884,7 @@
           <a:p>
             <a:fld id="{5CFEE199-47E7-4EA7-AFBD-8A4F6CCA5D88}" type="datetimeFigureOut">
               <a:rPr lang="en-US" smtClean="0"/>
-              <a:t>10/9/2014</a:t>
+              <a:t>10/16/2014</a:t>
             </a:fld>
             <a:endParaRPr lang="en-US"/>
           </a:p>
@@ -1979,7 +1979,7 @@
           <a:p>
             <a:fld id="{5CFEE199-47E7-4EA7-AFBD-8A4F6CCA5D88}" type="datetimeFigureOut">
               <a:rPr lang="en-US" smtClean="0"/>
-              <a:t>10/9/2014</a:t>
+              <a:t>10/16/2014</a:t>
             </a:fld>
             <a:endParaRPr lang="en-US"/>
           </a:p>
@@ -2256,7 +2256,7 @@
           <a:p>
             <a:fld id="{5CFEE199-47E7-4EA7-AFBD-8A4F6CCA5D88}" type="datetimeFigureOut">
               <a:rPr lang="en-US" smtClean="0"/>
-              <a:t>10/9/2014</a:t>
+              <a:t>10/16/2014</a:t>
             </a:fld>
             <a:endParaRPr lang="en-US"/>
           </a:p>
@@ -2509,7 +2509,7 @@
           <a:p>
             <a:fld id="{5CFEE199-47E7-4EA7-AFBD-8A4F6CCA5D88}" type="datetimeFigureOut">
               <a:rPr lang="en-US" smtClean="0"/>
-              <a:t>10/9/2014</a:t>
+              <a:t>10/16/2014</a:t>
             </a:fld>
             <a:endParaRPr lang="en-US"/>
           </a:p>
@@ -2722,7 +2722,7 @@
           <a:p>
             <a:fld id="{5CFEE199-47E7-4EA7-AFBD-8A4F6CCA5D88}" type="datetimeFigureOut">
               <a:rPr lang="en-US" smtClean="0"/>
-              <a:t>10/9/2014</a:t>
+              <a:t>10/16/2014</a:t>
             </a:fld>
             <a:endParaRPr lang="en-US"/>
           </a:p>
@@ -4808,8 +4808,8 @@
           </a:p>
         </p:txBody>
       </p:sp>
-      <mc:AlternateContent xmlns:mc="http://schemas.openxmlformats.org/markup-compatibility/2006">
-        <mc:Choice xmlns:a14="http://schemas.microsoft.com/office/drawing/2010/main" Requires="a14">
+      <mc:AlternateContent xmlns:mc="http://schemas.openxmlformats.org/markup-compatibility/2006" xmlns:a14="http://schemas.microsoft.com/office/drawing/2010/main">
+        <mc:Choice Requires="a14">
           <p:sp>
             <p:nvSpPr>
               <p:cNvPr id="108" name="TextBox 107"/>
@@ -4872,7 +4872,7 @@
             </p:txBody>
           </p:sp>
         </mc:Choice>
-        <mc:Fallback>
+        <mc:Fallback xmlns="">
           <p:sp>
             <p:nvSpPr>
               <p:cNvPr id="108" name="TextBox 107"/>
@@ -4911,8 +4911,8 @@
           </p:sp>
         </mc:Fallback>
       </mc:AlternateContent>
-      <mc:AlternateContent xmlns:mc="http://schemas.openxmlformats.org/markup-compatibility/2006">
-        <mc:Choice xmlns:a14="http://schemas.microsoft.com/office/drawing/2010/main" Requires="a14">
+      <mc:AlternateContent xmlns:mc="http://schemas.openxmlformats.org/markup-compatibility/2006" xmlns:a14="http://schemas.microsoft.com/office/drawing/2010/main">
+        <mc:Choice Requires="a14">
           <p:sp>
             <p:nvSpPr>
               <p:cNvPr id="109" name="TextBox 108"/>
@@ -4975,7 +4975,7 @@
             </p:txBody>
           </p:sp>
         </mc:Choice>
-        <mc:Fallback>
+        <mc:Fallback xmlns="">
           <p:sp>
             <p:nvSpPr>
               <p:cNvPr id="109" name="TextBox 108"/>
@@ -5014,8 +5014,8 @@
           </p:sp>
         </mc:Fallback>
       </mc:AlternateContent>
-      <mc:AlternateContent xmlns:mc="http://schemas.openxmlformats.org/markup-compatibility/2006">
-        <mc:Choice xmlns:a14="http://schemas.microsoft.com/office/drawing/2010/main" Requires="a14">
+      <mc:AlternateContent xmlns:mc="http://schemas.openxmlformats.org/markup-compatibility/2006" xmlns:a14="http://schemas.microsoft.com/office/drawing/2010/main">
+        <mc:Choice Requires="a14">
           <p:sp>
             <p:nvSpPr>
               <p:cNvPr id="110" name="TextBox 109"/>
@@ -5079,7 +5079,7 @@
             </p:txBody>
           </p:sp>
         </mc:Choice>
-        <mc:Fallback>
+        <mc:Fallback xmlns="">
           <p:sp>
             <p:nvSpPr>
               <p:cNvPr id="110" name="TextBox 109"/>
@@ -5153,8 +5153,8 @@
           </a:p>
         </p:txBody>
       </p:sp>
-      <mc:AlternateContent xmlns:mc="http://schemas.openxmlformats.org/markup-compatibility/2006">
-        <mc:Choice xmlns:a14="http://schemas.microsoft.com/office/drawing/2010/main" Requires="a14">
+      <mc:AlternateContent xmlns:mc="http://schemas.openxmlformats.org/markup-compatibility/2006" xmlns:a14="http://schemas.microsoft.com/office/drawing/2010/main">
+        <mc:Choice Requires="a14">
           <p:sp>
             <p:nvSpPr>
               <p:cNvPr id="112" name="TextBox 111"/>
@@ -5217,7 +5217,7 @@
             </p:txBody>
           </p:sp>
         </mc:Choice>
-        <mc:Fallback>
+        <mc:Fallback xmlns="">
           <p:sp>
             <p:nvSpPr>
               <p:cNvPr id="112" name="TextBox 111"/>
@@ -5422,7 +5422,7 @@
         </p:nvCxnSpPr>
         <p:spPr>
           <a:xfrm>
-            <a:off x="167633" y="3821644"/>
+            <a:off x="167633" y="2825326"/>
             <a:ext cx="814804" cy="0"/>
           </a:xfrm>
           <a:prstGeom prst="straightConnector1">
@@ -5456,7 +5456,7 @@
         </p:nvSpPr>
         <p:spPr>
           <a:xfrm>
-            <a:off x="967192" y="3125434"/>
+            <a:off x="967192" y="2471205"/>
             <a:ext cx="1471208" cy="1471749"/>
           </a:xfrm>
           <a:prstGeom prst="rect">
@@ -5519,108 +5519,89 @@
           </a:p>
         </p:txBody>
       </p:sp>
-      <p:cxnSp>
-        <p:nvCxnSpPr>
-          <p:cNvPr id="8" name="Elbow Connector 44"/>
-          <p:cNvCxnSpPr/>
-          <p:nvPr/>
-        </p:nvCxnSpPr>
-        <p:spPr>
-          <a:xfrm rot="16200000" flipH="1">
-            <a:off x="3307861" y="2782225"/>
-            <a:ext cx="616751" cy="526869"/>
-          </a:xfrm>
-          <a:prstGeom prst="bentConnector3">
-            <a:avLst>
-              <a:gd name="adj1" fmla="val 100832"/>
-            </a:avLst>
-          </a:prstGeom>
-          <a:ln w="57150">
-            <a:headEnd type="none" w="med" len="med"/>
-            <a:tailEnd type="arrow" w="med" len="med"/>
-          </a:ln>
-        </p:spPr>
-        <p:style>
-          <a:lnRef idx="1">
-            <a:schemeClr val="dk1"/>
-          </a:lnRef>
-          <a:fillRef idx="0">
-            <a:schemeClr val="dk1"/>
-          </a:fillRef>
-          <a:effectRef idx="0">
-            <a:schemeClr val="dk1"/>
-          </a:effectRef>
-          <a:fontRef idx="minor">
-            <a:schemeClr val="tx1"/>
-          </a:fontRef>
-        </p:style>
-      </p:cxnSp>
-      <p:cxnSp>
-        <p:nvCxnSpPr>
-          <p:cNvPr id="10" name="Elbow Connector 9"/>
-          <p:cNvCxnSpPr/>
-          <p:nvPr/>
-        </p:nvCxnSpPr>
-        <p:spPr>
-          <a:xfrm rot="10800000">
-            <a:off x="3429002" y="2737286"/>
-            <a:ext cx="4808775" cy="540551"/>
-          </a:xfrm>
-          <a:prstGeom prst="bentConnector3">
-            <a:avLst>
-              <a:gd name="adj1" fmla="val -4058"/>
-            </a:avLst>
-          </a:prstGeom>
-          <a:ln w="57150">
-            <a:headEnd type="none" w="med" len="med"/>
-            <a:tailEnd type="none" w="med" len="med"/>
-          </a:ln>
-        </p:spPr>
-        <p:style>
-          <a:lnRef idx="1">
-            <a:schemeClr val="dk1"/>
-          </a:lnRef>
-          <a:fillRef idx="0">
-            <a:schemeClr val="dk1"/>
-          </a:fillRef>
-          <a:effectRef idx="0">
-            <a:schemeClr val="dk1"/>
-          </a:effectRef>
-          <a:fontRef idx="minor">
-            <a:schemeClr val="tx1"/>
-          </a:fontRef>
-        </p:style>
-      </p:cxnSp>
-      <p:sp>
-        <p:nvSpPr>
-          <p:cNvPr id="16" name="TextBox 15"/>
-          <p:cNvSpPr txBox="1"/>
-          <p:nvPr/>
-        </p:nvSpPr>
-        <p:spPr>
-          <a:xfrm>
-            <a:off x="0" y="1721029"/>
-            <a:ext cx="869222" cy="307777"/>
-          </a:xfrm>
-          <a:prstGeom prst="rect">
-            <a:avLst/>
-          </a:prstGeom>
-          <a:noFill/>
-        </p:spPr>
-        <p:txBody>
-          <a:bodyPr wrap="square" rtlCol="0">
-            <a:spAutoFit/>
-          </a:bodyPr>
-          <a:lstStyle/>
-          <a:p>
-            <a:pPr algn="ctr"/>
-            <a:r>
-              <a:rPr lang="en-US" sz="1400" dirty="0" smtClean="0"/>
-              <a:t>Brake </a:t>
-            </a:r>
-          </a:p>
-        </p:txBody>
-      </p:sp>
+      <mc:AlternateContent xmlns:mc="http://schemas.openxmlformats.org/markup-compatibility/2006">
+        <mc:Choice xmlns:a14="http://schemas.microsoft.com/office/drawing/2010/main" Requires="a14">
+          <p:sp>
+            <p:nvSpPr>
+              <p:cNvPr id="16" name="TextBox 15"/>
+              <p:cNvSpPr txBox="1"/>
+              <p:nvPr/>
+            </p:nvSpPr>
+            <p:spPr>
+              <a:xfrm>
+                <a:off x="0" y="762000"/>
+                <a:ext cx="869222" cy="307777"/>
+              </a:xfrm>
+              <a:prstGeom prst="rect">
+                <a:avLst/>
+              </a:prstGeom>
+              <a:noFill/>
+            </p:spPr>
+            <p:txBody>
+              <a:bodyPr wrap="square" rtlCol="0">
+                <a:spAutoFit/>
+              </a:bodyPr>
+              <a:lstStyle/>
+              <a:p>
+                <a:pPr algn="ctr"/>
+                <a14:m>
+                  <m:oMath xmlns:m="http://schemas.openxmlformats.org/officeDocument/2006/math">
+                    <m:r>
+                      <a:rPr lang="en-US" sz="1400" i="1" smtClean="0">
+                        <a:latin typeface="Cambria Math"/>
+                        <a:ea typeface="Cambria Math"/>
+                      </a:rPr>
+                      <m:t>𝛽</m:t>
+                    </m:r>
+                  </m:oMath>
+                </a14:m>
+                <a:r>
+                  <a:rPr lang="en-US" sz="1400" dirty="0" smtClean="0"/>
+                  <a:t> </a:t>
+                </a:r>
+              </a:p>
+            </p:txBody>
+          </p:sp>
+        </mc:Choice>
+        <mc:Fallback>
+          <p:sp>
+            <p:nvSpPr>
+              <p:cNvPr id="16" name="TextBox 15"/>
+              <p:cNvSpPr txBox="1">
+                <a:spLocks noRot="1" noChangeAspect="1" noMove="1" noResize="1" noEditPoints="1" noAdjustHandles="1" noChangeArrowheads="1" noChangeShapeType="1" noTextEdit="1"/>
+              </p:cNvSpPr>
+              <p:nvPr/>
+            </p:nvSpPr>
+            <p:spPr>
+              <a:xfrm>
+                <a:off x="0" y="762000"/>
+                <a:ext cx="869222" cy="307777"/>
+              </a:xfrm>
+              <a:prstGeom prst="rect">
+                <a:avLst/>
+              </a:prstGeom>
+              <a:blipFill rotWithShape="1">
+                <a:blip r:embed="rId2"/>
+                <a:stretch>
+                  <a:fillRect b="-8000"/>
+                </a:stretch>
+              </a:blipFill>
+            </p:spPr>
+            <p:txBody>
+              <a:bodyPr/>
+              <a:lstStyle/>
+              <a:p>
+                <a:r>
+                  <a:rPr lang="en-US">
+                    <a:noFill/>
+                  </a:rPr>
+                  <a:t> </a:t>
+                </a:r>
+              </a:p>
+            </p:txBody>
+          </p:sp>
+        </mc:Fallback>
+      </mc:AlternateContent>
       <p:sp>
         <p:nvSpPr>
           <p:cNvPr id="18" name="Rectangle 17"/>
@@ -5629,7 +5610,7 @@
         </p:nvSpPr>
         <p:spPr>
           <a:xfrm>
-            <a:off x="3886200" y="3125434"/>
+            <a:off x="3886200" y="2471205"/>
             <a:ext cx="1482096" cy="1456509"/>
           </a:xfrm>
           <a:prstGeom prst="rect">
@@ -5671,7 +5652,7 @@
                   <a:sysClr val="windowText" lastClr="000000"/>
                 </a:solidFill>
               </a:rPr>
-              <a:t>Wheel</a:t>
+              <a:t>Tire</a:t>
             </a:r>
             <a:endParaRPr lang="en-US" dirty="0">
               <a:solidFill>
@@ -5689,7 +5670,7 @@
         </p:nvSpPr>
         <p:spPr>
           <a:xfrm>
-            <a:off x="6781800" y="3125434"/>
+            <a:off x="6784596" y="2457781"/>
             <a:ext cx="1455974" cy="1447800"/>
           </a:xfrm>
           <a:prstGeom prst="rect">
@@ -5749,8 +5730,8 @@
         </p:nvCxnSpPr>
         <p:spPr>
           <a:xfrm>
-            <a:off x="8431798" y="3277834"/>
-            <a:ext cx="712202" cy="0"/>
+            <a:off x="8263112" y="2984987"/>
+            <a:ext cx="903430" cy="0"/>
           </a:xfrm>
           <a:prstGeom prst="straightConnector1">
             <a:avLst/>
@@ -5778,13 +5759,15 @@
       <p:cxnSp>
         <p:nvCxnSpPr>
           <p:cNvPr id="23" name="Elbow Connector 44"/>
-          <p:cNvCxnSpPr/>
+          <p:cNvCxnSpPr>
+            <a:endCxn id="18" idx="2"/>
+          </p:cNvCxnSpPr>
           <p:nvPr/>
         </p:nvCxnSpPr>
         <p:spPr>
-          <a:xfrm>
-            <a:off x="2438400" y="3809057"/>
-            <a:ext cx="1441270" cy="0"/>
+          <a:xfrm flipV="1">
+            <a:off x="4619895" y="3927714"/>
+            <a:ext cx="7353" cy="380124"/>
           </a:xfrm>
           <a:prstGeom prst="straightConnector1">
             <a:avLst/>
@@ -5809,40 +5792,6 @@
           </a:fontRef>
         </p:style>
       </p:cxnSp>
-      <p:cxnSp>
-        <p:nvCxnSpPr>
-          <p:cNvPr id="38" name="Elbow Connector 44"/>
-          <p:cNvCxnSpPr/>
-          <p:nvPr/>
-        </p:nvCxnSpPr>
-        <p:spPr>
-          <a:xfrm>
-            <a:off x="5340530" y="3821644"/>
-            <a:ext cx="1441270" cy="0"/>
-          </a:xfrm>
-          <a:prstGeom prst="straightConnector1">
-            <a:avLst/>
-          </a:prstGeom>
-          <a:ln w="57150">
-            <a:headEnd type="none" w="med" len="med"/>
-            <a:tailEnd type="arrow" w="med" len="med"/>
-          </a:ln>
-        </p:spPr>
-        <p:style>
-          <a:lnRef idx="1">
-            <a:schemeClr val="dk1"/>
-          </a:lnRef>
-          <a:fillRef idx="0">
-            <a:schemeClr val="dk1"/>
-          </a:fillRef>
-          <a:effectRef idx="0">
-            <a:schemeClr val="dk1"/>
-          </a:effectRef>
-          <a:fontRef idx="minor">
-            <a:schemeClr val="tx1"/>
-          </a:fontRef>
-        </p:style>
-      </p:cxnSp>
       <p:sp>
         <p:nvSpPr>
           <p:cNvPr id="39" name="Rectangle 38"/>
@@ -5851,7 +5800,7 @@
         </p:nvSpPr>
         <p:spPr>
           <a:xfrm>
-            <a:off x="941072" y="1778726"/>
+            <a:off x="967192" y="819697"/>
             <a:ext cx="1471208" cy="735874"/>
           </a:xfrm>
           <a:prstGeom prst="rect">
@@ -5911,7 +5860,7 @@
         </p:nvCxnSpPr>
         <p:spPr>
           <a:xfrm>
-            <a:off x="75920" y="2118503"/>
+            <a:off x="75920" y="1159474"/>
             <a:ext cx="814804" cy="0"/>
           </a:xfrm>
           <a:prstGeom prst="straightConnector1">
@@ -5947,8 +5896,8 @@
         </p:nvCxnSpPr>
         <p:spPr>
           <a:xfrm>
-            <a:off x="2412280" y="2146663"/>
-            <a:ext cx="1467390" cy="1464131"/>
+            <a:off x="2438400" y="1187634"/>
+            <a:ext cx="1458687" cy="1435971"/>
           </a:xfrm>
           <a:prstGeom prst="bentConnector3">
             <a:avLst>
@@ -5977,14 +5926,14 @@
       </p:cxnSp>
       <p:sp>
         <p:nvSpPr>
-          <p:cNvPr id="54" name="Rectangle 53"/>
+          <p:cNvPr id="68" name="Rectangle 67"/>
           <p:cNvSpPr/>
           <p:nvPr/>
         </p:nvSpPr>
         <p:spPr>
           <a:xfrm>
-            <a:off x="3828231" y="1524000"/>
-            <a:ext cx="1471208" cy="735874"/>
+            <a:off x="3886200" y="4368043"/>
+            <a:ext cx="1482096" cy="728254"/>
           </a:xfrm>
           <a:prstGeom prst="rect">
             <a:avLst/>
@@ -6025,138 +5974,6 @@
                   <a:sysClr val="windowText" lastClr="000000"/>
                 </a:solidFill>
               </a:rPr>
-              <a:t>Drag</a:t>
-            </a:r>
-            <a:endParaRPr lang="en-US" dirty="0">
-              <a:solidFill>
-                <a:sysClr val="windowText" lastClr="000000"/>
-              </a:solidFill>
-            </a:endParaRPr>
-          </a:p>
-        </p:txBody>
-      </p:sp>
-      <p:cxnSp>
-        <p:nvCxnSpPr>
-          <p:cNvPr id="55" name="Elbow Connector 44"/>
-          <p:cNvCxnSpPr/>
-          <p:nvPr/>
-        </p:nvCxnSpPr>
-        <p:spPr>
-          <a:xfrm>
-            <a:off x="5299439" y="2118503"/>
-            <a:ext cx="1467390" cy="1237565"/>
-          </a:xfrm>
-          <a:prstGeom prst="bentConnector3">
-            <a:avLst>
-              <a:gd name="adj1" fmla="val 73146"/>
-            </a:avLst>
-          </a:prstGeom>
-          <a:ln w="57150">
-            <a:headEnd type="none" w="med" len="med"/>
-            <a:tailEnd type="arrow" w="med" len="med"/>
-          </a:ln>
-        </p:spPr>
-        <p:style>
-          <a:lnRef idx="1">
-            <a:schemeClr val="dk1"/>
-          </a:lnRef>
-          <a:fillRef idx="0">
-            <a:schemeClr val="dk1"/>
-          </a:fillRef>
-          <a:effectRef idx="0">
-            <a:schemeClr val="dk1"/>
-          </a:effectRef>
-          <a:fontRef idx="minor">
-            <a:schemeClr val="tx1"/>
-          </a:fontRef>
-        </p:style>
-      </p:cxnSp>
-      <p:cxnSp>
-        <p:nvCxnSpPr>
-          <p:cNvPr id="65" name="Elbow Connector 44"/>
-          <p:cNvCxnSpPr>
-            <a:endCxn id="68" idx="1"/>
-          </p:cNvCxnSpPr>
-          <p:nvPr/>
-        </p:nvCxnSpPr>
-        <p:spPr>
-          <a:xfrm rot="16200000" flipH="1">
-            <a:off x="3060520" y="4560718"/>
-            <a:ext cx="1041763" cy="609598"/>
-          </a:xfrm>
-          <a:prstGeom prst="bentConnector2">
-            <a:avLst/>
-          </a:prstGeom>
-          <a:ln w="57150">
-            <a:headEnd type="none" w="med" len="med"/>
-            <a:tailEnd type="none" w="med" len="med"/>
-          </a:ln>
-        </p:spPr>
-        <p:style>
-          <a:lnRef idx="1">
-            <a:schemeClr val="dk1"/>
-          </a:lnRef>
-          <a:fillRef idx="0">
-            <a:schemeClr val="dk1"/>
-          </a:fillRef>
-          <a:effectRef idx="0">
-            <a:schemeClr val="dk1"/>
-          </a:effectRef>
-          <a:fontRef idx="minor">
-            <a:schemeClr val="tx1"/>
-          </a:fontRef>
-        </p:style>
-      </p:cxnSp>
-      <p:sp>
-        <p:nvSpPr>
-          <p:cNvPr id="68" name="Rectangle 67"/>
-          <p:cNvSpPr/>
-          <p:nvPr/>
-        </p:nvSpPr>
-        <p:spPr>
-          <a:xfrm>
-            <a:off x="3886200" y="5022272"/>
-            <a:ext cx="1482096" cy="728254"/>
-          </a:xfrm>
-          <a:prstGeom prst="rect">
-            <a:avLst/>
-          </a:prstGeom>
-          <a:solidFill>
-            <a:schemeClr val="bg1"/>
-          </a:solidFill>
-          <a:ln w="76200">
-            <a:solidFill>
-              <a:schemeClr val="tx1"/>
-            </a:solidFill>
-          </a:ln>
-        </p:spPr>
-        <p:style>
-          <a:lnRef idx="2">
-            <a:schemeClr val="accent1">
-              <a:shade val="50000"/>
-            </a:schemeClr>
-          </a:lnRef>
-          <a:fillRef idx="1">
-            <a:schemeClr val="accent1"/>
-          </a:fillRef>
-          <a:effectRef idx="0">
-            <a:schemeClr val="accent1"/>
-          </a:effectRef>
-          <a:fontRef idx="minor">
-            <a:schemeClr val="lt1"/>
-          </a:fontRef>
-        </p:style>
-        <p:txBody>
-          <a:bodyPr rtlCol="0" anchor="ctr"/>
-          <a:lstStyle/>
-          <a:p>
-            <a:pPr algn="ctr"/>
-            <a:r>
-              <a:rPr lang="en-US" dirty="0" smtClean="0">
-                <a:solidFill>
-                  <a:sysClr val="windowText" lastClr="000000"/>
-                </a:solidFill>
-              </a:rPr>
               <a:t>Wheel Forces</a:t>
             </a:r>
           </a:p>
@@ -6180,47 +5997,13 @@
       </p:sp>
       <p:cxnSp>
         <p:nvCxnSpPr>
-          <p:cNvPr id="73" name="Elbow Connector 44"/>
-          <p:cNvCxnSpPr/>
-          <p:nvPr/>
-        </p:nvCxnSpPr>
-        <p:spPr>
-          <a:xfrm>
-            <a:off x="3276602" y="4344635"/>
-            <a:ext cx="603068" cy="1"/>
-          </a:xfrm>
-          <a:prstGeom prst="straightConnector1">
-            <a:avLst/>
-          </a:prstGeom>
-          <a:ln w="57150">
-            <a:headEnd type="none" w="med" len="med"/>
-            <a:tailEnd type="arrow" w="med" len="med"/>
-          </a:ln>
-        </p:spPr>
-        <p:style>
-          <a:lnRef idx="1">
-            <a:schemeClr val="dk1"/>
-          </a:lnRef>
-          <a:fillRef idx="0">
-            <a:schemeClr val="dk1"/>
-          </a:fillRef>
-          <a:effectRef idx="0">
-            <a:schemeClr val="dk1"/>
-          </a:effectRef>
-          <a:fontRef idx="minor">
-            <a:schemeClr val="tx1"/>
-          </a:fontRef>
-        </p:style>
-      </p:cxnSp>
-      <p:cxnSp>
-        <p:nvCxnSpPr>
           <p:cNvPr id="81" name="Elbow Connector 44"/>
           <p:cNvCxnSpPr/>
           <p:nvPr/>
         </p:nvCxnSpPr>
         <p:spPr>
           <a:xfrm rot="16200000" flipH="1">
-            <a:off x="8118279" y="4461912"/>
+            <a:off x="8118279" y="3807683"/>
             <a:ext cx="843213" cy="598630"/>
           </a:xfrm>
           <a:prstGeom prst="bentConnector3">
@@ -6256,7 +6039,7 @@
         </p:nvCxnSpPr>
         <p:spPr>
           <a:xfrm>
-            <a:off x="5368296" y="5182834"/>
+            <a:off x="5368296" y="4528605"/>
             <a:ext cx="3470904" cy="0"/>
           </a:xfrm>
           <a:prstGeom prst="straightConnector1">
@@ -6290,7 +6073,7 @@
         </p:nvCxnSpPr>
         <p:spPr>
           <a:xfrm>
-            <a:off x="5340530" y="5563834"/>
+            <a:off x="5340530" y="4909605"/>
             <a:ext cx="2279470" cy="0"/>
           </a:xfrm>
           <a:prstGeom prst="straightConnector1">
@@ -6318,14 +6101,14 @@
       </p:cxnSp>
       <p:sp>
         <p:nvSpPr>
-          <p:cNvPr id="105" name="TextBox 104"/>
+          <p:cNvPr id="107" name="TextBox 106"/>
           <p:cNvSpPr txBox="1"/>
           <p:nvPr/>
         </p:nvSpPr>
         <p:spPr>
           <a:xfrm>
-            <a:off x="-31022" y="3861308"/>
-            <a:ext cx="869222" cy="523220"/>
+            <a:off x="5181600" y="4909605"/>
+            <a:ext cx="2872259" cy="307777"/>
           </a:xfrm>
           <a:prstGeom prst="rect">
             <a:avLst/>
@@ -6341,203 +6124,124 @@
             <a:pPr algn="ctr"/>
             <a:r>
               <a:rPr lang="en-US" sz="1400" dirty="0" smtClean="0"/>
-              <a:t>Motor Torque</a:t>
-            </a:r>
-          </a:p>
-        </p:txBody>
-      </p:sp>
-      <p:sp>
-        <p:nvSpPr>
-          <p:cNvPr id="106" name="TextBox 105"/>
-          <p:cNvSpPr txBox="1"/>
-          <p:nvPr/>
-        </p:nvSpPr>
-        <p:spPr>
-          <a:xfrm>
-            <a:off x="6317022" y="4765083"/>
-            <a:ext cx="1923548" cy="307777"/>
-          </a:xfrm>
-          <a:prstGeom prst="rect">
-            <a:avLst/>
-          </a:prstGeom>
-          <a:noFill/>
-        </p:spPr>
-        <p:txBody>
-          <a:bodyPr wrap="square" rtlCol="0">
-            <a:spAutoFit/>
-          </a:bodyPr>
-          <a:lstStyle/>
-          <a:p>
-            <a:pPr algn="ctr"/>
-            <a:r>
-              <a:rPr lang="en-US" sz="1400" dirty="0" smtClean="0"/>
-              <a:t>Chassis Wheel Forces</a:t>
-            </a:r>
-          </a:p>
-        </p:txBody>
-      </p:sp>
-      <p:sp>
-        <p:nvSpPr>
-          <p:cNvPr id="107" name="TextBox 106"/>
-          <p:cNvSpPr txBox="1"/>
-          <p:nvPr/>
-        </p:nvSpPr>
-        <p:spPr>
-          <a:xfrm>
-            <a:off x="5181600" y="5563834"/>
-            <a:ext cx="2872259" cy="307777"/>
-          </a:xfrm>
-          <a:prstGeom prst="rect">
-            <a:avLst/>
-          </a:prstGeom>
-          <a:noFill/>
-        </p:spPr>
-        <p:txBody>
-          <a:bodyPr wrap="square" rtlCol="0">
-            <a:spAutoFit/>
-          </a:bodyPr>
-          <a:lstStyle/>
-          <a:p>
-            <a:pPr algn="ctr"/>
-            <a:r>
-              <a:rPr lang="en-US" sz="1400" dirty="0" smtClean="0"/>
               <a:t>Environment Wheel Forces</a:t>
             </a:r>
           </a:p>
         </p:txBody>
       </p:sp>
-      <p:sp>
-        <p:nvSpPr>
-          <p:cNvPr id="108" name="TextBox 107"/>
-          <p:cNvSpPr txBox="1"/>
-          <p:nvPr/>
-        </p:nvSpPr>
-        <p:spPr>
-          <a:xfrm>
-            <a:off x="2559778" y="3853688"/>
-            <a:ext cx="869222" cy="307777"/>
-          </a:xfrm>
-          <a:prstGeom prst="rect">
-            <a:avLst/>
-          </a:prstGeom>
-          <a:noFill/>
-        </p:spPr>
-        <p:txBody>
-          <a:bodyPr wrap="square" rtlCol="0">
-            <a:spAutoFit/>
-          </a:bodyPr>
-          <a:lstStyle/>
-          <a:p>
-            <a:pPr algn="ctr"/>
-            <a:r>
-              <a:rPr lang="en-US" sz="1400" dirty="0" smtClean="0"/>
-              <a:t>Torque</a:t>
-            </a:r>
-          </a:p>
-        </p:txBody>
-      </p:sp>
-      <p:sp>
-        <p:nvSpPr>
-          <p:cNvPr id="109" name="TextBox 108"/>
-          <p:cNvSpPr txBox="1"/>
-          <p:nvPr/>
-        </p:nvSpPr>
-        <p:spPr>
-          <a:xfrm>
-            <a:off x="2438400" y="1825823"/>
-            <a:ext cx="1062988" cy="307777"/>
-          </a:xfrm>
-          <a:prstGeom prst="rect">
-            <a:avLst/>
-          </a:prstGeom>
-          <a:noFill/>
-        </p:spPr>
-        <p:txBody>
-          <a:bodyPr wrap="square" rtlCol="0">
-            <a:spAutoFit/>
-          </a:bodyPr>
-          <a:lstStyle/>
-          <a:p>
-            <a:pPr algn="ctr"/>
-            <a:r>
-              <a:rPr lang="en-US" sz="1400" dirty="0" smtClean="0"/>
-              <a:t>Brake Force</a:t>
-            </a:r>
-          </a:p>
-        </p:txBody>
-      </p:sp>
-      <p:sp>
-        <p:nvSpPr>
-          <p:cNvPr id="110" name="TextBox 109"/>
-          <p:cNvSpPr txBox="1"/>
-          <p:nvPr/>
-        </p:nvSpPr>
-        <p:spPr>
-          <a:xfrm>
-            <a:off x="5340530" y="1811811"/>
-            <a:ext cx="1062988" cy="307777"/>
-          </a:xfrm>
-          <a:prstGeom prst="rect">
-            <a:avLst/>
-          </a:prstGeom>
-          <a:noFill/>
-        </p:spPr>
-        <p:txBody>
-          <a:bodyPr wrap="square" rtlCol="0">
-            <a:spAutoFit/>
-          </a:bodyPr>
-          <a:lstStyle/>
-          <a:p>
-            <a:pPr algn="ctr"/>
-            <a:r>
-              <a:rPr lang="en-US" sz="1400" dirty="0" smtClean="0"/>
-              <a:t>Drag Force</a:t>
-            </a:r>
-          </a:p>
-        </p:txBody>
-      </p:sp>
-      <p:sp>
-        <p:nvSpPr>
-          <p:cNvPr id="112" name="TextBox 111"/>
-          <p:cNvSpPr txBox="1"/>
-          <p:nvPr/>
-        </p:nvSpPr>
-        <p:spPr>
-          <a:xfrm>
-            <a:off x="6676246" y="2342421"/>
-            <a:ext cx="1606459" cy="307777"/>
-          </a:xfrm>
-          <a:prstGeom prst="rect">
-            <a:avLst/>
-          </a:prstGeom>
-          <a:noFill/>
-        </p:spPr>
-        <p:txBody>
-          <a:bodyPr wrap="square" rtlCol="0">
-            <a:spAutoFit/>
-          </a:bodyPr>
-          <a:lstStyle/>
-          <a:p>
-            <a:pPr algn="ctr"/>
-            <a:r>
-              <a:rPr lang="en-US" sz="1400" dirty="0" smtClean="0"/>
-              <a:t>Vehicle Speed</a:t>
-            </a:r>
-          </a:p>
-        </p:txBody>
-      </p:sp>
+      <mc:AlternateContent xmlns:mc="http://schemas.openxmlformats.org/markup-compatibility/2006">
+        <mc:Choice xmlns:a14="http://schemas.microsoft.com/office/drawing/2010/main" Requires="a14">
+          <p:sp>
+            <p:nvSpPr>
+              <p:cNvPr id="109" name="TextBox 108"/>
+              <p:cNvSpPr txBox="1"/>
+              <p:nvPr/>
+            </p:nvSpPr>
+            <p:spPr>
+              <a:xfrm>
+                <a:off x="2438400" y="866794"/>
+                <a:ext cx="1062988" cy="307777"/>
+              </a:xfrm>
+              <a:prstGeom prst="rect">
+                <a:avLst/>
+              </a:prstGeom>
+              <a:noFill/>
+            </p:spPr>
+            <p:txBody>
+              <a:bodyPr wrap="square" rtlCol="0">
+                <a:spAutoFit/>
+              </a:bodyPr>
+              <a:lstStyle/>
+              <a:p>
+                <a:pPr algn="ctr"/>
+                <a14:m>
+                  <m:oMathPara xmlns:m="http://schemas.openxmlformats.org/officeDocument/2006/math">
+                    <m:oMathParaPr>
+                      <m:jc m:val="centerGroup"/>
+                    </m:oMathParaPr>
+                    <m:oMath xmlns:m="http://schemas.openxmlformats.org/officeDocument/2006/math">
+                      <m:sSub>
+                        <m:sSubPr>
+                          <m:ctrlPr>
+                            <a:rPr lang="en-US" sz="1400" b="0" i="1" smtClean="0">
+                              <a:latin typeface="Cambria Math"/>
+                            </a:rPr>
+                          </m:ctrlPr>
+                        </m:sSubPr>
+                        <m:e>
+                          <m:r>
+                            <a:rPr lang="en-US" sz="1400" b="0" i="1" smtClean="0">
+                              <a:latin typeface="Cambria Math"/>
+                            </a:rPr>
+                            <m:t>𝐹</m:t>
+                          </m:r>
+                        </m:e>
+                        <m:sub>
+                          <m:r>
+                            <a:rPr lang="en-US" sz="1400" b="0" i="1" smtClean="0">
+                              <a:latin typeface="Cambria Math"/>
+                            </a:rPr>
+                            <m:t>𝑏</m:t>
+                          </m:r>
+                        </m:sub>
+                      </m:sSub>
+                    </m:oMath>
+                  </m:oMathPara>
+                </a14:m>
+                <a:endParaRPr lang="en-US" sz="1400" dirty="0" smtClean="0"/>
+              </a:p>
+            </p:txBody>
+          </p:sp>
+        </mc:Choice>
+        <mc:Fallback>
+          <p:sp>
+            <p:nvSpPr>
+              <p:cNvPr id="109" name="TextBox 108"/>
+              <p:cNvSpPr txBox="1">
+                <a:spLocks noRot="1" noChangeAspect="1" noMove="1" noResize="1" noEditPoints="1" noAdjustHandles="1" noChangeArrowheads="1" noChangeShapeType="1" noTextEdit="1"/>
+              </p:cNvSpPr>
+              <p:nvPr/>
+            </p:nvSpPr>
+            <p:spPr>
+              <a:xfrm>
+                <a:off x="2438400" y="866794"/>
+                <a:ext cx="1062988" cy="307777"/>
+              </a:xfrm>
+              <a:prstGeom prst="rect">
+                <a:avLst/>
+              </a:prstGeom>
+              <a:blipFill rotWithShape="1">
+                <a:blip r:embed="rId3"/>
+                <a:stretch>
+                  <a:fillRect/>
+                </a:stretch>
+              </a:blipFill>
+            </p:spPr>
+            <p:txBody>
+              <a:bodyPr/>
+              <a:lstStyle/>
+              <a:p>
+                <a:r>
+                  <a:rPr lang="en-US">
+                    <a:noFill/>
+                  </a:rPr>
+                  <a:t> </a:t>
+                </a:r>
+              </a:p>
+            </p:txBody>
+          </p:sp>
+        </mc:Fallback>
+      </mc:AlternateContent>
       <p:cxnSp>
         <p:nvCxnSpPr>
-          <p:cNvPr id="114" name="Elbow Connector 44"/>
-          <p:cNvCxnSpPr>
-            <a:endCxn id="54" idx="2"/>
-          </p:cNvCxnSpPr>
+          <p:cNvPr id="120" name="Elbow Connector 44"/>
+          <p:cNvCxnSpPr/>
           <p:nvPr/>
         </p:nvCxnSpPr>
         <p:spPr>
-          <a:xfrm flipV="1">
-            <a:off x="4563835" y="2259874"/>
-            <a:ext cx="0" cy="477411"/>
+          <a:xfrm>
+            <a:off x="8245694" y="3420757"/>
+            <a:ext cx="898306" cy="0"/>
           </a:xfrm>
           <a:prstGeom prst="straightConnector1">
             <a:avLst/>
@@ -6562,16 +6266,100 @@
           </a:fontRef>
         </p:style>
       </p:cxnSp>
-      <p:sp>
-        <p:nvSpPr>
-          <p:cNvPr id="117" name="TextBox 116"/>
+      <mc:AlternateContent xmlns:mc="http://schemas.openxmlformats.org/markup-compatibility/2006" xmlns:a14="http://schemas.microsoft.com/office/drawing/2010/main">
+        <mc:Choice Requires="a14">
+          <p:sp>
+            <p:nvSpPr>
+              <p:cNvPr id="122" name="TextBox 121"/>
+              <p:cNvSpPr txBox="1"/>
+              <p:nvPr/>
+            </p:nvSpPr>
+            <p:spPr>
+              <a:xfrm>
+                <a:off x="8245696" y="2623605"/>
+                <a:ext cx="804688" cy="307777"/>
+              </a:xfrm>
+              <a:prstGeom prst="rect">
+                <a:avLst/>
+              </a:prstGeom>
+              <a:noFill/>
+            </p:spPr>
+            <p:txBody>
+              <a:bodyPr wrap="square" rtlCol="0">
+                <a:spAutoFit/>
+              </a:bodyPr>
+              <a:lstStyle/>
+              <a:p>
+                <a:pPr algn="ctr"/>
+                <a14:m>
+                  <m:oMathPara xmlns:m="http://schemas.openxmlformats.org/officeDocument/2006/math">
+                    <m:oMathParaPr>
+                      <m:jc m:val="centerGroup"/>
+                    </m:oMathParaPr>
+                    <m:oMath xmlns:m="http://schemas.openxmlformats.org/officeDocument/2006/math">
+                      <m:r>
+                        <a:rPr lang="en-US" sz="1400" b="0" i="1" smtClean="0">
+                          <a:latin typeface="Cambria Math"/>
+                        </a:rPr>
+                        <m:t>𝑣</m:t>
+                      </m:r>
+                    </m:oMath>
+                  </m:oMathPara>
+                </a14:m>
+                <a:endParaRPr lang="en-US" sz="1400" dirty="0" smtClean="0"/>
+              </a:p>
+            </p:txBody>
+          </p:sp>
+        </mc:Choice>
+        <mc:Fallback xmlns="">
+          <p:sp>
+            <p:nvSpPr>
+              <p:cNvPr id="122" name="TextBox 121"/>
+              <p:cNvSpPr txBox="1">
+                <a:spLocks noRot="1" noChangeAspect="1" noMove="1" noResize="1" noEditPoints="1" noAdjustHandles="1" noChangeArrowheads="1" noChangeShapeType="1" noTextEdit="1"/>
+              </p:cNvSpPr>
+              <p:nvPr/>
+            </p:nvSpPr>
+            <p:spPr>
+              <a:xfrm>
+                <a:off x="8245696" y="2623605"/>
+                <a:ext cx="804688" cy="307777"/>
+              </a:xfrm>
+              <a:prstGeom prst="rect">
+                <a:avLst/>
+              </a:prstGeom>
+              <a:blipFill rotWithShape="1">
+                <a:blip r:embed="rId4"/>
+                <a:stretch>
+                  <a:fillRect/>
+                </a:stretch>
+              </a:blipFill>
+            </p:spPr>
+            <p:txBody>
+              <a:bodyPr/>
+              <a:lstStyle/>
+              <a:p>
+                <a:r>
+                  <a:rPr lang="en-US">
+                    <a:noFill/>
+                  </a:rPr>
+                  <a:t> </a:t>
+                </a:r>
+              </a:p>
+            </p:txBody>
+          </p:sp>
+        </mc:Fallback>
+      </mc:AlternateContent>
+      <p:sp>
+        <p:nvSpPr>
+          <p:cNvPr id="124" name="TextBox 123"/>
           <p:cNvSpPr txBox="1"/>
           <p:nvPr/>
         </p:nvSpPr>
         <p:spPr>
           <a:xfrm>
-            <a:off x="2514600" y="4761227"/>
-            <a:ext cx="869222" cy="523220"/>
+            <a:off x="982437" y="80274"/>
+            <a:ext cx="6957882" cy="646331"/>
           </a:xfrm>
           <a:prstGeom prst="rect">
             <a:avLst/>
@@ -6586,52 +6374,959 @@
           <a:p>
             <a:pPr algn="ctr"/>
             <a:r>
-              <a:rPr lang="en-US" sz="1400" dirty="0" smtClean="0"/>
-              <a:t>Wheel Forces</a:t>
-            </a:r>
-          </a:p>
-        </p:txBody>
-      </p:sp>
-      <p:sp>
-        <p:nvSpPr>
-          <p:cNvPr id="118" name="TextBox 117"/>
-          <p:cNvSpPr txBox="1"/>
-          <p:nvPr/>
-        </p:nvSpPr>
-        <p:spPr>
-          <a:xfrm>
-            <a:off x="5534296" y="3899855"/>
-            <a:ext cx="869222" cy="523220"/>
-          </a:xfrm>
-          <a:prstGeom prst="rect">
-            <a:avLst/>
-          </a:prstGeom>
-          <a:noFill/>
-        </p:spPr>
-        <p:txBody>
-          <a:bodyPr wrap="square" rtlCol="0">
-            <a:spAutoFit/>
-          </a:bodyPr>
-          <a:lstStyle/>
-          <a:p>
-            <a:pPr algn="ctr"/>
-            <a:r>
-              <a:rPr lang="en-US" sz="1400" dirty="0" smtClean="0"/>
-              <a:t>Force Applied</a:t>
-            </a:r>
+              <a:rPr lang="en-US" sz="3600" u="sng" dirty="0" smtClean="0"/>
+              <a:t>Chassis</a:t>
+            </a:r>
+            <a:endParaRPr lang="en-US" sz="3600" u="sng" dirty="0"/>
           </a:p>
         </p:txBody>
       </p:sp>
       <p:cxnSp>
         <p:nvCxnSpPr>
-          <p:cNvPr id="120" name="Elbow Connector 44"/>
+          <p:cNvPr id="37" name="Elbow Connector 44"/>
           <p:cNvCxnSpPr/>
           <p:nvPr/>
         </p:nvCxnSpPr>
         <p:spPr>
           <a:xfrm>
-            <a:off x="8245694" y="3801054"/>
-            <a:ext cx="898306" cy="0"/>
+            <a:off x="152388" y="3353347"/>
+            <a:ext cx="814804" cy="0"/>
+          </a:xfrm>
+          <a:prstGeom prst="straightConnector1">
+            <a:avLst/>
+          </a:prstGeom>
+          <a:ln w="57150">
+            <a:headEnd type="arrow" w="med" len="med"/>
+            <a:tailEnd type="none" w="med" len="med"/>
+          </a:ln>
+        </p:spPr>
+        <p:style>
+          <a:lnRef idx="1">
+            <a:schemeClr val="dk1"/>
+          </a:lnRef>
+          <a:fillRef idx="0">
+            <a:schemeClr val="dk1"/>
+          </a:fillRef>
+          <a:effectRef idx="0">
+            <a:schemeClr val="dk1"/>
+          </a:effectRef>
+          <a:fontRef idx="minor">
+            <a:schemeClr val="tx1"/>
+          </a:fontRef>
+        </p:style>
+      </p:cxnSp>
+      <mc:AlternateContent xmlns:mc="http://schemas.openxmlformats.org/markup-compatibility/2006" xmlns:a14="http://schemas.microsoft.com/office/drawing/2010/main">
+        <mc:Choice Requires="a14">
+          <p:sp>
+            <p:nvSpPr>
+              <p:cNvPr id="42" name="TextBox 41"/>
+              <p:cNvSpPr txBox="1"/>
+              <p:nvPr/>
+            </p:nvSpPr>
+            <p:spPr>
+              <a:xfrm>
+                <a:off x="48711" y="3507236"/>
+                <a:ext cx="869222" cy="307777"/>
+              </a:xfrm>
+              <a:prstGeom prst="rect">
+                <a:avLst/>
+              </a:prstGeom>
+              <a:noFill/>
+            </p:spPr>
+            <p:txBody>
+              <a:bodyPr wrap="square" rtlCol="0">
+                <a:spAutoFit/>
+              </a:bodyPr>
+              <a:lstStyle/>
+              <a:p>
+                <a:pPr algn="ctr"/>
+                <a14:m>
+                  <m:oMathPara xmlns:m="http://schemas.openxmlformats.org/officeDocument/2006/math">
+                    <m:oMathParaPr>
+                      <m:jc m:val="centerGroup"/>
+                    </m:oMathParaPr>
+                    <m:oMath xmlns:m="http://schemas.openxmlformats.org/officeDocument/2006/math">
+                      <m:sSub>
+                        <m:sSubPr>
+                          <m:ctrlPr>
+                            <a:rPr lang="en-US" sz="1400" b="0" i="1" smtClean="0">
+                              <a:latin typeface="Cambria Math"/>
+                              <a:ea typeface="Cambria Math"/>
+                            </a:rPr>
+                          </m:ctrlPr>
+                        </m:sSubPr>
+                        <m:e>
+                          <m:r>
+                            <a:rPr lang="en-US" sz="1400" i="1" smtClean="0">
+                              <a:latin typeface="Cambria Math"/>
+                              <a:ea typeface="Cambria Math"/>
+                            </a:rPr>
+                            <m:t>𝜔</m:t>
+                          </m:r>
+                        </m:e>
+                        <m:sub>
+                          <m:r>
+                            <a:rPr lang="en-US" sz="1400" b="0" i="1" smtClean="0">
+                              <a:latin typeface="Cambria Math"/>
+                              <a:ea typeface="Cambria Math"/>
+                            </a:rPr>
+                            <m:t>𝑡</m:t>
+                          </m:r>
+                        </m:sub>
+                      </m:sSub>
+                    </m:oMath>
+                  </m:oMathPara>
+                </a14:m>
+                <a:endParaRPr lang="en-US" sz="1400" dirty="0" smtClean="0"/>
+              </a:p>
+            </p:txBody>
+          </p:sp>
+        </mc:Choice>
+        <mc:Fallback xmlns="">
+          <p:sp>
+            <p:nvSpPr>
+              <p:cNvPr id="42" name="TextBox 41"/>
+              <p:cNvSpPr txBox="1">
+                <a:spLocks noRot="1" noChangeAspect="1" noMove="1" noResize="1" noEditPoints="1" noAdjustHandles="1" noChangeArrowheads="1" noChangeShapeType="1" noTextEdit="1"/>
+              </p:cNvSpPr>
+              <p:nvPr/>
+            </p:nvSpPr>
+            <p:spPr>
+              <a:xfrm>
+                <a:off x="48711" y="3507236"/>
+                <a:ext cx="869222" cy="307777"/>
+              </a:xfrm>
+              <a:prstGeom prst="rect">
+                <a:avLst/>
+              </a:prstGeom>
+              <a:blipFill rotWithShape="1">
+                <a:blip r:embed="rId5"/>
+                <a:stretch>
+                  <a:fillRect/>
+                </a:stretch>
+              </a:blipFill>
+            </p:spPr>
+            <p:txBody>
+              <a:bodyPr/>
+              <a:lstStyle/>
+              <a:p>
+                <a:r>
+                  <a:rPr lang="en-US">
+                    <a:noFill/>
+                  </a:rPr>
+                  <a:t> </a:t>
+                </a:r>
+              </a:p>
+            </p:txBody>
+          </p:sp>
+        </mc:Fallback>
+      </mc:AlternateContent>
+      <mc:AlternateContent xmlns:mc="http://schemas.openxmlformats.org/markup-compatibility/2006" xmlns:a14="http://schemas.microsoft.com/office/drawing/2010/main">
+        <mc:Choice Requires="a14">
+          <p:sp>
+            <p:nvSpPr>
+              <p:cNvPr id="43" name="TextBox 42"/>
+              <p:cNvSpPr txBox="1"/>
+              <p:nvPr/>
+            </p:nvSpPr>
+            <p:spPr>
+              <a:xfrm>
+                <a:off x="2643052" y="2982889"/>
+                <a:ext cx="869222" cy="325282"/>
+              </a:xfrm>
+              <a:prstGeom prst="rect">
+                <a:avLst/>
+              </a:prstGeom>
+              <a:noFill/>
+            </p:spPr>
+            <p:txBody>
+              <a:bodyPr wrap="square" rtlCol="0">
+                <a:spAutoFit/>
+              </a:bodyPr>
+              <a:lstStyle/>
+              <a:p>
+                <a:pPr algn="ctr"/>
+                <a14:m>
+                  <m:oMathPara xmlns:m="http://schemas.openxmlformats.org/officeDocument/2006/math">
+                    <m:oMathParaPr>
+                      <m:jc m:val="centerGroup"/>
+                    </m:oMathParaPr>
+                    <m:oMath xmlns:m="http://schemas.openxmlformats.org/officeDocument/2006/math">
+                      <m:sSub>
+                        <m:sSubPr>
+                          <m:ctrlPr>
+                            <a:rPr lang="en-US" sz="1400" b="0" i="1" smtClean="0">
+                              <a:latin typeface="Cambria Math"/>
+                              <a:ea typeface="Cambria Math"/>
+                            </a:rPr>
+                          </m:ctrlPr>
+                        </m:sSubPr>
+                        <m:e>
+                          <m:r>
+                            <a:rPr lang="en-US" sz="1400" b="0" i="1" smtClean="0">
+                              <a:latin typeface="Cambria Math"/>
+                              <a:ea typeface="Cambria Math"/>
+                            </a:rPr>
+                            <m:t>𝜏</m:t>
+                          </m:r>
+                        </m:e>
+                        <m:sub>
+                          <m:r>
+                            <a:rPr lang="en-US" sz="1400" b="0" i="1" smtClean="0">
+                              <a:latin typeface="Cambria Math"/>
+                              <a:ea typeface="Cambria Math"/>
+                            </a:rPr>
+                            <m:t>𝑔</m:t>
+                          </m:r>
+                        </m:sub>
+                      </m:sSub>
+                    </m:oMath>
+                  </m:oMathPara>
+                </a14:m>
+                <a:endParaRPr lang="en-US" sz="1400" dirty="0" smtClean="0"/>
+              </a:p>
+            </p:txBody>
+          </p:sp>
+        </mc:Choice>
+        <mc:Fallback xmlns="">
+          <p:sp>
+            <p:nvSpPr>
+              <p:cNvPr id="43" name="TextBox 42"/>
+              <p:cNvSpPr txBox="1">
+                <a:spLocks noRot="1" noChangeAspect="1" noMove="1" noResize="1" noEditPoints="1" noAdjustHandles="1" noChangeArrowheads="1" noChangeShapeType="1" noTextEdit="1"/>
+              </p:cNvSpPr>
+              <p:nvPr/>
+            </p:nvSpPr>
+            <p:spPr>
+              <a:xfrm>
+                <a:off x="2643052" y="2982889"/>
+                <a:ext cx="869222" cy="325282"/>
+              </a:xfrm>
+              <a:prstGeom prst="rect">
+                <a:avLst/>
+              </a:prstGeom>
+              <a:blipFill rotWithShape="1">
+                <a:blip r:embed="rId6"/>
+                <a:stretch>
+                  <a:fillRect/>
+                </a:stretch>
+              </a:blipFill>
+            </p:spPr>
+            <p:txBody>
+              <a:bodyPr/>
+              <a:lstStyle/>
+              <a:p>
+                <a:r>
+                  <a:rPr lang="en-US">
+                    <a:noFill/>
+                  </a:rPr>
+                  <a:t> </a:t>
+                </a:r>
+              </a:p>
+            </p:txBody>
+          </p:sp>
+        </mc:Fallback>
+      </mc:AlternateContent>
+      <p:cxnSp>
+        <p:nvCxnSpPr>
+          <p:cNvPr id="44" name="Elbow Connector 44"/>
+          <p:cNvCxnSpPr/>
+          <p:nvPr/>
+        </p:nvCxnSpPr>
+        <p:spPr>
+          <a:xfrm>
+            <a:off x="2455817" y="3583336"/>
+            <a:ext cx="1441270" cy="0"/>
+          </a:xfrm>
+          <a:prstGeom prst="straightConnector1">
+            <a:avLst/>
+          </a:prstGeom>
+          <a:ln w="57150">
+            <a:headEnd type="arrow" w="med" len="med"/>
+            <a:tailEnd type="none" w="med" len="med"/>
+          </a:ln>
+        </p:spPr>
+        <p:style>
+          <a:lnRef idx="1">
+            <a:schemeClr val="dk1"/>
+          </a:lnRef>
+          <a:fillRef idx="0">
+            <a:schemeClr val="dk1"/>
+          </a:fillRef>
+          <a:effectRef idx="0">
+            <a:schemeClr val="dk1"/>
+          </a:effectRef>
+          <a:fontRef idx="minor">
+            <a:schemeClr val="tx1"/>
+          </a:fontRef>
+        </p:style>
+      </p:cxnSp>
+      <mc:AlternateContent xmlns:mc="http://schemas.openxmlformats.org/markup-compatibility/2006" xmlns:a14="http://schemas.microsoft.com/office/drawing/2010/main">
+        <mc:Choice Requires="a14">
+          <p:sp>
+            <p:nvSpPr>
+              <p:cNvPr id="45" name="TextBox 44"/>
+              <p:cNvSpPr txBox="1"/>
+              <p:nvPr/>
+            </p:nvSpPr>
+            <p:spPr>
+              <a:xfrm>
+                <a:off x="2643052" y="3587946"/>
+                <a:ext cx="869222" cy="307777"/>
+              </a:xfrm>
+              <a:prstGeom prst="rect">
+                <a:avLst/>
+              </a:prstGeom>
+              <a:noFill/>
+            </p:spPr>
+            <p:txBody>
+              <a:bodyPr wrap="square" rtlCol="0">
+                <a:spAutoFit/>
+              </a:bodyPr>
+              <a:lstStyle/>
+              <a:p>
+                <a:pPr algn="ctr"/>
+                <a14:m>
+                  <m:oMathPara xmlns:m="http://schemas.openxmlformats.org/officeDocument/2006/math">
+                    <m:oMathParaPr>
+                      <m:jc m:val="centerGroup"/>
+                    </m:oMathParaPr>
+                    <m:oMath xmlns:m="http://schemas.openxmlformats.org/officeDocument/2006/math">
+                      <m:sSub>
+                        <m:sSubPr>
+                          <m:ctrlPr>
+                            <a:rPr lang="en-US" sz="1400" b="0" i="1" smtClean="0">
+                              <a:latin typeface="Cambria Math"/>
+                              <a:ea typeface="Cambria Math"/>
+                            </a:rPr>
+                          </m:ctrlPr>
+                        </m:sSubPr>
+                        <m:e>
+                          <m:r>
+                            <a:rPr lang="en-US" sz="1400" b="0" i="1" smtClean="0">
+                              <a:latin typeface="Cambria Math"/>
+                              <a:ea typeface="Cambria Math"/>
+                            </a:rPr>
+                            <m:t>𝜏</m:t>
+                          </m:r>
+                        </m:e>
+                        <m:sub>
+                          <m:r>
+                            <a:rPr lang="en-US" sz="1400" b="0" i="1" smtClean="0">
+                              <a:latin typeface="Cambria Math"/>
+                              <a:ea typeface="Cambria Math"/>
+                            </a:rPr>
+                            <m:t>𝑡</m:t>
+                          </m:r>
+                        </m:sub>
+                      </m:sSub>
+                    </m:oMath>
+                  </m:oMathPara>
+                </a14:m>
+                <a:endParaRPr lang="en-US" sz="1400" dirty="0" smtClean="0"/>
+              </a:p>
+            </p:txBody>
+          </p:sp>
+        </mc:Choice>
+        <mc:Fallback xmlns="">
+          <p:sp>
+            <p:nvSpPr>
+              <p:cNvPr id="45" name="TextBox 44"/>
+              <p:cNvSpPr txBox="1">
+                <a:spLocks noRot="1" noChangeAspect="1" noMove="1" noResize="1" noEditPoints="1" noAdjustHandles="1" noChangeArrowheads="1" noChangeShapeType="1" noTextEdit="1"/>
+              </p:cNvSpPr>
+              <p:nvPr/>
+            </p:nvSpPr>
+            <p:spPr>
+              <a:xfrm>
+                <a:off x="2643052" y="3587946"/>
+                <a:ext cx="869222" cy="307777"/>
+              </a:xfrm>
+              <a:prstGeom prst="rect">
+                <a:avLst/>
+              </a:prstGeom>
+              <a:blipFill rotWithShape="1">
+                <a:blip r:embed="rId7"/>
+                <a:stretch>
+                  <a:fillRect/>
+                </a:stretch>
+              </a:blipFill>
+            </p:spPr>
+            <p:txBody>
+              <a:bodyPr/>
+              <a:lstStyle/>
+              <a:p>
+                <a:r>
+                  <a:rPr lang="en-US">
+                    <a:noFill/>
+                  </a:rPr>
+                  <a:t> </a:t>
+                </a:r>
+              </a:p>
+            </p:txBody>
+          </p:sp>
+        </mc:Fallback>
+      </mc:AlternateContent>
+      <mc:AlternateContent xmlns:mc="http://schemas.openxmlformats.org/markup-compatibility/2006" xmlns:a14="http://schemas.microsoft.com/office/drawing/2010/main">
+        <mc:Choice Requires="a14">
+          <p:sp>
+            <p:nvSpPr>
+              <p:cNvPr id="46" name="TextBox 45"/>
+              <p:cNvSpPr txBox="1"/>
+              <p:nvPr/>
+            </p:nvSpPr>
+            <p:spPr>
+              <a:xfrm>
+                <a:off x="59051" y="2488913"/>
+                <a:ext cx="869222" cy="307777"/>
+              </a:xfrm>
+              <a:prstGeom prst="rect">
+                <a:avLst/>
+              </a:prstGeom>
+              <a:noFill/>
+            </p:spPr>
+            <p:txBody>
+              <a:bodyPr wrap="square" rtlCol="0">
+                <a:spAutoFit/>
+              </a:bodyPr>
+              <a:lstStyle/>
+              <a:p>
+                <a:pPr algn="ctr"/>
+                <a14:m>
+                  <m:oMathPara xmlns:m="http://schemas.openxmlformats.org/officeDocument/2006/math">
+                    <m:oMathParaPr>
+                      <m:jc m:val="centerGroup"/>
+                    </m:oMathParaPr>
+                    <m:oMath xmlns:m="http://schemas.openxmlformats.org/officeDocument/2006/math">
+                      <m:sSub>
+                        <m:sSubPr>
+                          <m:ctrlPr>
+                            <a:rPr lang="en-US" sz="1400" b="0" i="1" smtClean="0">
+                              <a:latin typeface="Cambria Math"/>
+                              <a:ea typeface="Cambria Math"/>
+                            </a:rPr>
+                          </m:ctrlPr>
+                        </m:sSubPr>
+                        <m:e>
+                          <m:r>
+                            <a:rPr lang="en-US" sz="1400" b="0" i="1" smtClean="0">
+                              <a:latin typeface="Cambria Math"/>
+                              <a:ea typeface="Cambria Math"/>
+                            </a:rPr>
+                            <m:t>𝜏</m:t>
+                          </m:r>
+                        </m:e>
+                        <m:sub>
+                          <m:r>
+                            <a:rPr lang="en-US" sz="1400" b="0" i="1" smtClean="0">
+                              <a:latin typeface="Cambria Math"/>
+                              <a:ea typeface="Cambria Math"/>
+                            </a:rPr>
+                            <m:t>𝑚</m:t>
+                          </m:r>
+                        </m:sub>
+                      </m:sSub>
+                    </m:oMath>
+                  </m:oMathPara>
+                </a14:m>
+                <a:endParaRPr lang="en-US" sz="1400" dirty="0" smtClean="0"/>
+              </a:p>
+            </p:txBody>
+          </p:sp>
+        </mc:Choice>
+        <mc:Fallback xmlns="">
+          <p:sp>
+            <p:nvSpPr>
+              <p:cNvPr id="46" name="TextBox 45"/>
+              <p:cNvSpPr txBox="1">
+                <a:spLocks noRot="1" noChangeAspect="1" noMove="1" noResize="1" noEditPoints="1" noAdjustHandles="1" noChangeArrowheads="1" noChangeShapeType="1" noTextEdit="1"/>
+              </p:cNvSpPr>
+              <p:nvPr/>
+            </p:nvSpPr>
+            <p:spPr>
+              <a:xfrm>
+                <a:off x="59051" y="2488913"/>
+                <a:ext cx="869222" cy="307777"/>
+              </a:xfrm>
+              <a:prstGeom prst="rect">
+                <a:avLst/>
+              </a:prstGeom>
+              <a:blipFill rotWithShape="1">
+                <a:blip r:embed="rId8"/>
+                <a:stretch>
+                  <a:fillRect/>
+                </a:stretch>
+              </a:blipFill>
+            </p:spPr>
+            <p:txBody>
+              <a:bodyPr/>
+              <a:lstStyle/>
+              <a:p>
+                <a:r>
+                  <a:rPr lang="en-US">
+                    <a:noFill/>
+                  </a:rPr>
+                  <a:t> </a:t>
+                </a:r>
+              </a:p>
+            </p:txBody>
+          </p:sp>
+        </mc:Fallback>
+      </mc:AlternateContent>
+      <mc:AlternateContent xmlns:mc="http://schemas.openxmlformats.org/markup-compatibility/2006" xmlns:a14="http://schemas.microsoft.com/office/drawing/2010/main">
+        <mc:Choice Requires="a14">
+          <p:sp>
+            <p:nvSpPr>
+              <p:cNvPr id="49" name="TextBox 48"/>
+              <p:cNvSpPr txBox="1"/>
+              <p:nvPr/>
+            </p:nvSpPr>
+            <p:spPr>
+              <a:xfrm>
+                <a:off x="5587135" y="3280169"/>
+                <a:ext cx="869222" cy="307777"/>
+              </a:xfrm>
+              <a:prstGeom prst="rect">
+                <a:avLst/>
+              </a:prstGeom>
+              <a:noFill/>
+            </p:spPr>
+            <p:txBody>
+              <a:bodyPr wrap="square" rtlCol="0">
+                <a:spAutoFit/>
+              </a:bodyPr>
+              <a:lstStyle/>
+              <a:p>
+                <a:pPr algn="ctr"/>
+                <a14:m>
+                  <m:oMathPara xmlns:m="http://schemas.openxmlformats.org/officeDocument/2006/math">
+                    <m:oMathParaPr>
+                      <m:jc m:val="centerGroup"/>
+                    </m:oMathParaPr>
+                    <m:oMath xmlns:m="http://schemas.openxmlformats.org/officeDocument/2006/math">
+                      <m:sSub>
+                        <m:sSubPr>
+                          <m:ctrlPr>
+                            <a:rPr lang="en-US" sz="1400" b="0" i="1" smtClean="0">
+                              <a:latin typeface="Cambria Math"/>
+                              <a:ea typeface="Cambria Math"/>
+                            </a:rPr>
+                          </m:ctrlPr>
+                        </m:sSubPr>
+                        <m:e>
+                          <m:r>
+                            <a:rPr lang="en-US" sz="1400" b="0" i="1" smtClean="0">
+                              <a:latin typeface="Cambria Math"/>
+                              <a:ea typeface="Cambria Math"/>
+                            </a:rPr>
+                            <m:t>𝐹</m:t>
+                          </m:r>
+                        </m:e>
+                        <m:sub>
+                          <m:r>
+                            <a:rPr lang="en-US" sz="1400" b="0" i="1" smtClean="0">
+                              <a:latin typeface="Cambria Math"/>
+                              <a:ea typeface="Cambria Math"/>
+                            </a:rPr>
+                            <m:t>𝑡</m:t>
+                          </m:r>
+                        </m:sub>
+                      </m:sSub>
+                    </m:oMath>
+                  </m:oMathPara>
+                </a14:m>
+                <a:endParaRPr lang="en-US" sz="1400" dirty="0" smtClean="0"/>
+              </a:p>
+            </p:txBody>
+          </p:sp>
+        </mc:Choice>
+        <mc:Fallback xmlns="">
+          <p:sp>
+            <p:nvSpPr>
+              <p:cNvPr id="49" name="TextBox 48"/>
+              <p:cNvSpPr txBox="1">
+                <a:spLocks noRot="1" noChangeAspect="1" noMove="1" noResize="1" noEditPoints="1" noAdjustHandles="1" noChangeArrowheads="1" noChangeShapeType="1" noTextEdit="1"/>
+              </p:cNvSpPr>
+              <p:nvPr/>
+            </p:nvSpPr>
+            <p:spPr>
+              <a:xfrm>
+                <a:off x="5587135" y="3280169"/>
+                <a:ext cx="869222" cy="307777"/>
+              </a:xfrm>
+              <a:prstGeom prst="rect">
+                <a:avLst/>
+              </a:prstGeom>
+              <a:blipFill rotWithShape="1">
+                <a:blip r:embed="rId9"/>
+                <a:stretch>
+                  <a:fillRect/>
+                </a:stretch>
+              </a:blipFill>
+            </p:spPr>
+            <p:txBody>
+              <a:bodyPr/>
+              <a:lstStyle/>
+              <a:p>
+                <a:r>
+                  <a:rPr lang="en-US">
+                    <a:noFill/>
+                  </a:rPr>
+                  <a:t> </a:t>
+                </a:r>
+              </a:p>
+            </p:txBody>
+          </p:sp>
+        </mc:Fallback>
+      </mc:AlternateContent>
+      <mc:AlternateContent xmlns:mc="http://schemas.openxmlformats.org/markup-compatibility/2006" xmlns:a14="http://schemas.microsoft.com/office/drawing/2010/main">
+        <mc:Choice Requires="a14">
+          <p:sp>
+            <p:nvSpPr>
+              <p:cNvPr id="59" name="TextBox 58"/>
+              <p:cNvSpPr txBox="1"/>
+              <p:nvPr/>
+            </p:nvSpPr>
+            <p:spPr>
+              <a:xfrm>
+                <a:off x="8236217" y="3045570"/>
+                <a:ext cx="804688" cy="307777"/>
+              </a:xfrm>
+              <a:prstGeom prst="rect">
+                <a:avLst/>
+              </a:prstGeom>
+              <a:noFill/>
+            </p:spPr>
+            <p:txBody>
+              <a:bodyPr wrap="square" rtlCol="0">
+                <a:spAutoFit/>
+              </a:bodyPr>
+              <a:lstStyle/>
+              <a:p>
+                <a:pPr algn="ctr"/>
+                <a14:m>
+                  <m:oMathPara xmlns:m="http://schemas.openxmlformats.org/officeDocument/2006/math">
+                    <m:oMathParaPr>
+                      <m:jc m:val="centerGroup"/>
+                    </m:oMathParaPr>
+                    <m:oMath xmlns:m="http://schemas.openxmlformats.org/officeDocument/2006/math">
+                      <m:r>
+                        <a:rPr lang="en-US" sz="1400" b="0" i="1" smtClean="0">
+                          <a:latin typeface="Cambria Math"/>
+                        </a:rPr>
+                        <m:t>𝑑</m:t>
+                      </m:r>
+                    </m:oMath>
+                  </m:oMathPara>
+                </a14:m>
+                <a:endParaRPr lang="en-US" sz="1400" dirty="0" smtClean="0"/>
+              </a:p>
+            </p:txBody>
+          </p:sp>
+        </mc:Choice>
+        <mc:Fallback xmlns="">
+          <p:sp>
+            <p:nvSpPr>
+              <p:cNvPr id="59" name="TextBox 58"/>
+              <p:cNvSpPr txBox="1">
+                <a:spLocks noRot="1" noChangeAspect="1" noMove="1" noResize="1" noEditPoints="1" noAdjustHandles="1" noChangeArrowheads="1" noChangeShapeType="1" noTextEdit="1"/>
+              </p:cNvSpPr>
+              <p:nvPr/>
+            </p:nvSpPr>
+            <p:spPr>
+              <a:xfrm>
+                <a:off x="8236217" y="3045570"/>
+                <a:ext cx="804688" cy="307777"/>
+              </a:xfrm>
+              <a:prstGeom prst="rect">
+                <a:avLst/>
+              </a:prstGeom>
+              <a:blipFill rotWithShape="1">
+                <a:blip r:embed="rId10"/>
+                <a:stretch>
+                  <a:fillRect/>
+                </a:stretch>
+              </a:blipFill>
+            </p:spPr>
+            <p:txBody>
+              <a:bodyPr/>
+              <a:lstStyle/>
+              <a:p>
+                <a:r>
+                  <a:rPr lang="en-US">
+                    <a:noFill/>
+                  </a:rPr>
+                  <a:t> </a:t>
+                </a:r>
+              </a:p>
+            </p:txBody>
+          </p:sp>
+        </mc:Fallback>
+      </mc:AlternateContent>
+      <mc:AlternateContent xmlns:mc="http://schemas.openxmlformats.org/markup-compatibility/2006" xmlns:a14="http://schemas.microsoft.com/office/drawing/2010/main">
+        <mc:Choice Requires="a14">
+          <p:sp>
+            <p:nvSpPr>
+              <p:cNvPr id="60" name="TextBox 59"/>
+              <p:cNvSpPr txBox="1"/>
+              <p:nvPr/>
+            </p:nvSpPr>
+            <p:spPr>
+              <a:xfrm>
+                <a:off x="6926860" y="4120083"/>
+                <a:ext cx="869222" cy="307777"/>
+              </a:xfrm>
+              <a:prstGeom prst="rect">
+                <a:avLst/>
+              </a:prstGeom>
+              <a:noFill/>
+            </p:spPr>
+            <p:txBody>
+              <a:bodyPr wrap="square" rtlCol="0">
+                <a:spAutoFit/>
+              </a:bodyPr>
+              <a:lstStyle/>
+              <a:p>
+                <a:pPr algn="ctr"/>
+                <a14:m>
+                  <m:oMathPara xmlns:m="http://schemas.openxmlformats.org/officeDocument/2006/math">
+                    <m:oMathParaPr>
+                      <m:jc m:val="centerGroup"/>
+                    </m:oMathParaPr>
+                    <m:oMath xmlns:m="http://schemas.openxmlformats.org/officeDocument/2006/math">
+                      <m:sSub>
+                        <m:sSubPr>
+                          <m:ctrlPr>
+                            <a:rPr lang="en-US" sz="1400" b="0" i="1" smtClean="0">
+                              <a:latin typeface="Cambria Math"/>
+                              <a:ea typeface="Cambria Math"/>
+                            </a:rPr>
+                          </m:ctrlPr>
+                        </m:sSubPr>
+                        <m:e>
+                          <m:r>
+                            <a:rPr lang="en-US" sz="1400" b="0" i="1" smtClean="0">
+                              <a:latin typeface="Cambria Math"/>
+                              <a:ea typeface="Cambria Math"/>
+                            </a:rPr>
+                            <m:t>𝐹</m:t>
+                          </m:r>
+                        </m:e>
+                        <m:sub>
+                          <m:r>
+                            <a:rPr lang="en-US" sz="1400" b="0" i="1" smtClean="0">
+                              <a:latin typeface="Cambria Math"/>
+                              <a:ea typeface="Cambria Math"/>
+                            </a:rPr>
+                            <m:t>𝑐</m:t>
+                          </m:r>
+                        </m:sub>
+                      </m:sSub>
+                      <m:r>
+                        <a:rPr lang="en-US" sz="1400" b="0" i="1" smtClean="0">
+                          <a:latin typeface="Cambria Math"/>
+                          <a:ea typeface="Cambria Math"/>
+                        </a:rPr>
+                        <m:t>,</m:t>
+                      </m:r>
+                      <m:sSub>
+                        <m:sSubPr>
+                          <m:ctrlPr>
+                            <a:rPr lang="en-US" sz="1400" i="1">
+                              <a:latin typeface="Cambria Math"/>
+                              <a:ea typeface="Cambria Math"/>
+                            </a:rPr>
+                          </m:ctrlPr>
+                        </m:sSubPr>
+                        <m:e>
+                          <m:r>
+                            <a:rPr lang="en-US" sz="1400" i="1">
+                              <a:latin typeface="Cambria Math"/>
+                              <a:ea typeface="Cambria Math"/>
+                            </a:rPr>
+                            <m:t>𝜃</m:t>
+                          </m:r>
+                        </m:e>
+                        <m:sub>
+                          <m:r>
+                            <a:rPr lang="en-US" sz="1400" i="1">
+                              <a:latin typeface="Cambria Math"/>
+                              <a:ea typeface="Cambria Math"/>
+                            </a:rPr>
+                            <m:t>𝑙</m:t>
+                          </m:r>
+                        </m:sub>
+                      </m:sSub>
+                      <m:r>
+                        <m:rPr>
+                          <m:nor/>
+                        </m:rPr>
+                        <a:rPr lang="en-US" sz="1400" dirty="0"/>
+                        <m:t> </m:t>
+                      </m:r>
+                    </m:oMath>
+                  </m:oMathPara>
+                </a14:m>
+                <a:endParaRPr lang="en-US" sz="1400" dirty="0"/>
+              </a:p>
+            </p:txBody>
+          </p:sp>
+        </mc:Choice>
+        <mc:Fallback xmlns="">
+          <p:sp>
+            <p:nvSpPr>
+              <p:cNvPr id="60" name="TextBox 59"/>
+              <p:cNvSpPr txBox="1">
+                <a:spLocks noRot="1" noChangeAspect="1" noMove="1" noResize="1" noEditPoints="1" noAdjustHandles="1" noChangeArrowheads="1" noChangeShapeType="1" noTextEdit="1"/>
+              </p:cNvSpPr>
+              <p:nvPr/>
+            </p:nvSpPr>
+            <p:spPr>
+              <a:xfrm>
+                <a:off x="6926860" y="4120083"/>
+                <a:ext cx="869222" cy="307777"/>
+              </a:xfrm>
+              <a:prstGeom prst="rect">
+                <a:avLst/>
+              </a:prstGeom>
+              <a:blipFill rotWithShape="1">
+                <a:blip r:embed="rId11"/>
+                <a:stretch>
+                  <a:fillRect/>
+                </a:stretch>
+              </a:blipFill>
+            </p:spPr>
+            <p:txBody>
+              <a:bodyPr/>
+              <a:lstStyle/>
+              <a:p>
+                <a:r>
+                  <a:rPr lang="en-US">
+                    <a:noFill/>
+                  </a:rPr>
+                  <a:t> </a:t>
+                </a:r>
+              </a:p>
+            </p:txBody>
+          </p:sp>
+        </mc:Fallback>
+      </mc:AlternateContent>
+      <mc:AlternateContent xmlns:mc="http://schemas.openxmlformats.org/markup-compatibility/2006" xmlns:a14="http://schemas.microsoft.com/office/drawing/2010/main">
+        <mc:Choice Requires="a14">
+          <p:sp>
+            <p:nvSpPr>
+              <p:cNvPr id="62" name="TextBox 61"/>
+              <p:cNvSpPr txBox="1"/>
+              <p:nvPr/>
+            </p:nvSpPr>
+            <p:spPr>
+              <a:xfrm>
+                <a:off x="4613647" y="3996941"/>
+                <a:ext cx="869222" cy="307777"/>
+              </a:xfrm>
+              <a:prstGeom prst="rect">
+                <a:avLst/>
+              </a:prstGeom>
+              <a:noFill/>
+            </p:spPr>
+            <p:txBody>
+              <a:bodyPr wrap="square" rtlCol="0">
+                <a:spAutoFit/>
+              </a:bodyPr>
+              <a:lstStyle/>
+              <a:p>
+                <a:pPr algn="ctr"/>
+                <a14:m>
+                  <m:oMathPara xmlns:m="http://schemas.openxmlformats.org/officeDocument/2006/math">
+                    <m:oMathParaPr>
+                      <m:jc m:val="centerGroup"/>
+                    </m:oMathParaPr>
+                    <m:oMath xmlns:m="http://schemas.openxmlformats.org/officeDocument/2006/math">
+                      <m:sSub>
+                        <m:sSubPr>
+                          <m:ctrlPr>
+                            <a:rPr lang="en-US" sz="1400" b="0" i="1" smtClean="0">
+                              <a:latin typeface="Cambria Math"/>
+                              <a:ea typeface="Cambria Math"/>
+                            </a:rPr>
+                          </m:ctrlPr>
+                        </m:sSubPr>
+                        <m:e>
+                          <m:r>
+                            <a:rPr lang="en-US" sz="1400" b="0" i="1" smtClean="0">
+                              <a:latin typeface="Cambria Math"/>
+                              <a:ea typeface="Cambria Math"/>
+                            </a:rPr>
+                            <m:t>𝐹</m:t>
+                          </m:r>
+                        </m:e>
+                        <m:sub>
+                          <m:r>
+                            <a:rPr lang="en-US" sz="1400" b="0" i="1" smtClean="0">
+                              <a:latin typeface="Cambria Math"/>
+                              <a:ea typeface="Cambria Math"/>
+                            </a:rPr>
+                            <m:t>𝑤</m:t>
+                          </m:r>
+                        </m:sub>
+                      </m:sSub>
+                    </m:oMath>
+                  </m:oMathPara>
+                </a14:m>
+                <a:endParaRPr lang="en-US" sz="1400" dirty="0" smtClean="0"/>
+              </a:p>
+            </p:txBody>
+          </p:sp>
+        </mc:Choice>
+        <mc:Fallback xmlns="">
+          <p:sp>
+            <p:nvSpPr>
+              <p:cNvPr id="62" name="TextBox 61"/>
+              <p:cNvSpPr txBox="1">
+                <a:spLocks noRot="1" noChangeAspect="1" noMove="1" noResize="1" noEditPoints="1" noAdjustHandles="1" noChangeArrowheads="1" noChangeShapeType="1" noTextEdit="1"/>
+              </p:cNvSpPr>
+              <p:nvPr/>
+            </p:nvSpPr>
+            <p:spPr>
+              <a:xfrm>
+                <a:off x="4613647" y="3996941"/>
+                <a:ext cx="869222" cy="307777"/>
+              </a:xfrm>
+              <a:prstGeom prst="rect">
+                <a:avLst/>
+              </a:prstGeom>
+              <a:blipFill rotWithShape="1">
+                <a:blip r:embed="rId12"/>
+                <a:stretch>
+                  <a:fillRect/>
+                </a:stretch>
+              </a:blipFill>
+            </p:spPr>
+            <p:txBody>
+              <a:bodyPr/>
+              <a:lstStyle/>
+              <a:p>
+                <a:r>
+                  <a:rPr lang="en-US">
+                    <a:noFill/>
+                  </a:rPr>
+                  <a:t> </a:t>
+                </a:r>
+              </a:p>
+            </p:txBody>
+          </p:sp>
+        </mc:Fallback>
+      </mc:AlternateContent>
+      <p:cxnSp>
+        <p:nvCxnSpPr>
+          <p:cNvPr id="63" name="Elbow Connector 44"/>
+          <p:cNvCxnSpPr/>
+          <p:nvPr/>
+        </p:nvCxnSpPr>
+        <p:spPr>
+          <a:xfrm flipV="1">
+            <a:off x="2480787" y="2909392"/>
+            <a:ext cx="1416300" cy="17779"/>
           </a:xfrm>
           <a:prstGeom prst="straightConnector1">
             <a:avLst/>
@@ -6656,86 +7351,407 @@
           </a:fontRef>
         </p:style>
       </p:cxnSp>
-      <p:sp>
-        <p:nvSpPr>
-          <p:cNvPr id="122" name="TextBox 121"/>
-          <p:cNvSpPr txBox="1"/>
-          <p:nvPr/>
-        </p:nvSpPr>
-        <p:spPr>
-          <a:xfrm>
-            <a:off x="8263112" y="3485328"/>
-            <a:ext cx="804688" cy="307777"/>
-          </a:xfrm>
-          <a:prstGeom prst="rect">
-            <a:avLst/>
-          </a:prstGeom>
-          <a:noFill/>
-        </p:spPr>
-        <p:txBody>
-          <a:bodyPr wrap="square" rtlCol="0">
-            <a:spAutoFit/>
-          </a:bodyPr>
-          <a:lstStyle/>
-          <a:p>
-            <a:pPr algn="ctr"/>
-            <a:r>
-              <a:rPr lang="en-US" sz="1400" dirty="0" smtClean="0"/>
-              <a:t>Pos.</a:t>
-            </a:r>
-          </a:p>
-        </p:txBody>
-      </p:sp>
-      <p:sp>
-        <p:nvSpPr>
-          <p:cNvPr id="124" name="TextBox 123"/>
-          <p:cNvSpPr txBox="1"/>
-          <p:nvPr/>
-        </p:nvSpPr>
-        <p:spPr>
-          <a:xfrm>
-            <a:off x="838200" y="76200"/>
-            <a:ext cx="6957882" cy="646331"/>
-          </a:xfrm>
-          <a:prstGeom prst="rect">
-            <a:avLst/>
-          </a:prstGeom>
-          <a:noFill/>
-        </p:spPr>
-        <p:txBody>
-          <a:bodyPr wrap="square" rtlCol="0">
-            <a:spAutoFit/>
-          </a:bodyPr>
-          <a:lstStyle/>
-          <a:p>
-            <a:pPr algn="ctr"/>
-            <a:r>
-              <a:rPr lang="en-US" sz="3600" u="sng" dirty="0" smtClean="0"/>
-              <a:t>Chassis</a:t>
-            </a:r>
-            <a:endParaRPr lang="en-US" sz="3600" u="sng" dirty="0"/>
-          </a:p>
-        </p:txBody>
-      </p:sp>
       <p:cxnSp>
         <p:nvCxnSpPr>
-          <p:cNvPr id="133" name="Elbow Connector 44"/>
+          <p:cNvPr id="64" name="Elbow Connector 44"/>
           <p:cNvCxnSpPr/>
           <p:nvPr/>
         </p:nvCxnSpPr>
         <p:spPr>
-          <a:xfrm rot="10800000" flipV="1">
-            <a:off x="989374" y="2737285"/>
-            <a:ext cx="2439627" cy="580428"/>
+          <a:xfrm flipV="1">
+            <a:off x="5342747" y="2751626"/>
+            <a:ext cx="1416300" cy="17779"/>
+          </a:xfrm>
+          <a:prstGeom prst="straightConnector1">
+            <a:avLst/>
+          </a:prstGeom>
+          <a:ln w="57150">
+            <a:headEnd type="arrow" w="med" len="med"/>
+            <a:tailEnd type="none" w="med" len="med"/>
+          </a:ln>
+        </p:spPr>
+        <p:style>
+          <a:lnRef idx="1">
+            <a:schemeClr val="dk1"/>
+          </a:lnRef>
+          <a:fillRef idx="0">
+            <a:schemeClr val="dk1"/>
+          </a:fillRef>
+          <a:effectRef idx="0">
+            <a:schemeClr val="dk1"/>
+          </a:effectRef>
+          <a:fontRef idx="minor">
+            <a:schemeClr val="tx1"/>
+          </a:fontRef>
+        </p:style>
+      </p:cxnSp>
+      <p:cxnSp>
+        <p:nvCxnSpPr>
+          <p:cNvPr id="66" name="Elbow Connector 44"/>
+          <p:cNvCxnSpPr/>
+          <p:nvPr/>
+        </p:nvCxnSpPr>
+        <p:spPr>
+          <a:xfrm flipV="1">
+            <a:off x="5340530" y="3636961"/>
+            <a:ext cx="1416300" cy="17779"/>
+          </a:xfrm>
+          <a:prstGeom prst="straightConnector1">
+            <a:avLst/>
+          </a:prstGeom>
+          <a:ln w="57150">
+            <a:headEnd type="none" w="med" len="med"/>
+            <a:tailEnd type="arrow" w="med" len="med"/>
+          </a:ln>
+        </p:spPr>
+        <p:style>
+          <a:lnRef idx="1">
+            <a:schemeClr val="dk1"/>
+          </a:lnRef>
+          <a:fillRef idx="0">
+            <a:schemeClr val="dk1"/>
+          </a:fillRef>
+          <a:effectRef idx="0">
+            <a:schemeClr val="dk1"/>
+          </a:effectRef>
+          <a:fontRef idx="minor">
+            <a:schemeClr val="tx1"/>
+          </a:fontRef>
+        </p:style>
+      </p:cxnSp>
+      <mc:AlternateContent xmlns:mc="http://schemas.openxmlformats.org/markup-compatibility/2006" xmlns:a14="http://schemas.microsoft.com/office/drawing/2010/main">
+        <mc:Choice Requires="a14">
+          <p:sp>
+            <p:nvSpPr>
+              <p:cNvPr id="67" name="TextBox 66"/>
+              <p:cNvSpPr txBox="1"/>
+              <p:nvPr/>
+            </p:nvSpPr>
+            <p:spPr>
+              <a:xfrm>
+                <a:off x="5567541" y="2335024"/>
+                <a:ext cx="869222" cy="307777"/>
+              </a:xfrm>
+              <a:prstGeom prst="rect">
+                <a:avLst/>
+              </a:prstGeom>
+              <a:noFill/>
+            </p:spPr>
+            <p:txBody>
+              <a:bodyPr wrap="square" rtlCol="0">
+                <a:spAutoFit/>
+              </a:bodyPr>
+              <a:lstStyle/>
+              <a:p>
+                <a:pPr algn="ctr"/>
+                <a14:m>
+                  <m:oMath xmlns:m="http://schemas.openxmlformats.org/officeDocument/2006/math">
+                    <m:sSub>
+                      <m:sSubPr>
+                        <m:ctrlPr>
+                          <a:rPr lang="en-US" sz="1400" b="0" i="1" smtClean="0">
+                            <a:latin typeface="Cambria Math"/>
+                            <a:ea typeface="Cambria Math"/>
+                          </a:rPr>
+                        </m:ctrlPr>
+                      </m:sSubPr>
+                      <m:e>
+                        <m:r>
+                          <a:rPr lang="en-US" sz="1400" i="1" smtClean="0">
+                            <a:latin typeface="Cambria Math"/>
+                            <a:ea typeface="Cambria Math"/>
+                          </a:rPr>
+                          <m:t>𝜃</m:t>
+                        </m:r>
+                      </m:e>
+                      <m:sub>
+                        <m:r>
+                          <a:rPr lang="en-US" sz="1400" b="0" i="1" smtClean="0">
+                            <a:latin typeface="Cambria Math"/>
+                            <a:ea typeface="Cambria Math"/>
+                          </a:rPr>
+                          <m:t>𝑙</m:t>
+                        </m:r>
+                      </m:sub>
+                    </m:sSub>
+                  </m:oMath>
+                </a14:m>
+                <a:r>
+                  <a:rPr lang="en-US" sz="1400" dirty="0" smtClean="0"/>
+                  <a:t> </a:t>
+                </a:r>
+              </a:p>
+            </p:txBody>
+          </p:sp>
+        </mc:Choice>
+        <mc:Fallback xmlns="">
+          <p:sp>
+            <p:nvSpPr>
+              <p:cNvPr id="67" name="TextBox 66"/>
+              <p:cNvSpPr txBox="1">
+                <a:spLocks noRot="1" noChangeAspect="1" noMove="1" noResize="1" noEditPoints="1" noAdjustHandles="1" noChangeArrowheads="1" noChangeShapeType="1" noTextEdit="1"/>
+              </p:cNvSpPr>
+              <p:nvPr/>
+            </p:nvSpPr>
+            <p:spPr>
+              <a:xfrm>
+                <a:off x="5567541" y="2335024"/>
+                <a:ext cx="869222" cy="307777"/>
+              </a:xfrm>
+              <a:prstGeom prst="rect">
+                <a:avLst/>
+              </a:prstGeom>
+              <a:blipFill rotWithShape="1">
+                <a:blip r:embed="rId13"/>
+                <a:stretch>
+                  <a:fillRect/>
+                </a:stretch>
+              </a:blipFill>
+            </p:spPr>
+            <p:txBody>
+              <a:bodyPr/>
+              <a:lstStyle/>
+              <a:p>
+                <a:r>
+                  <a:rPr lang="en-US">
+                    <a:noFill/>
+                  </a:rPr>
+                  <a:t> </a:t>
+                </a:r>
+              </a:p>
+            </p:txBody>
+          </p:sp>
+        </mc:Fallback>
+      </mc:AlternateContent>
+      <p:cxnSp>
+        <p:nvCxnSpPr>
+          <p:cNvPr id="70" name="Elbow Connector 44"/>
+          <p:cNvCxnSpPr/>
+          <p:nvPr/>
+        </p:nvCxnSpPr>
+        <p:spPr>
+          <a:xfrm flipV="1">
+            <a:off x="1371600" y="1555571"/>
+            <a:ext cx="0" cy="902210"/>
+          </a:xfrm>
+          <a:prstGeom prst="straightConnector1">
+            <a:avLst/>
+          </a:prstGeom>
+          <a:ln w="57150">
+            <a:headEnd type="none" w="med" len="med"/>
+            <a:tailEnd type="arrow" w="med" len="med"/>
+          </a:ln>
+        </p:spPr>
+        <p:style>
+          <a:lnRef idx="1">
+            <a:schemeClr val="dk1"/>
+          </a:lnRef>
+          <a:fillRef idx="0">
+            <a:schemeClr val="dk1"/>
+          </a:fillRef>
+          <a:effectRef idx="0">
+            <a:schemeClr val="dk1"/>
+          </a:effectRef>
+          <a:fontRef idx="minor">
+            <a:schemeClr val="tx1"/>
+          </a:fontRef>
+        </p:style>
+      </p:cxnSp>
+      <mc:AlternateContent xmlns:mc="http://schemas.openxmlformats.org/markup-compatibility/2006">
+        <mc:Choice xmlns:a14="http://schemas.microsoft.com/office/drawing/2010/main" Requires="a14">
+          <p:sp>
+            <p:nvSpPr>
+              <p:cNvPr id="72" name="TextBox 71"/>
+              <p:cNvSpPr txBox="1"/>
+              <p:nvPr/>
+            </p:nvSpPr>
+            <p:spPr>
+              <a:xfrm>
+                <a:off x="388098" y="1860987"/>
+                <a:ext cx="869222" cy="307777"/>
+              </a:xfrm>
+              <a:prstGeom prst="rect">
+                <a:avLst/>
+              </a:prstGeom>
+              <a:noFill/>
+            </p:spPr>
+            <p:txBody>
+              <a:bodyPr wrap="square" rtlCol="0">
+                <a:spAutoFit/>
+              </a:bodyPr>
+              <a:lstStyle/>
+              <a:p>
+                <a:pPr algn="ctr"/>
+                <a14:m>
+                  <m:oMathPara xmlns:m="http://schemas.openxmlformats.org/officeDocument/2006/math">
+                    <m:oMathParaPr>
+                      <m:jc m:val="centerGroup"/>
+                    </m:oMathParaPr>
+                    <m:oMath xmlns:m="http://schemas.openxmlformats.org/officeDocument/2006/math">
+                      <m:sSub>
+                        <m:sSubPr>
+                          <m:ctrlPr>
+                            <a:rPr lang="en-US" sz="1400" b="0" i="1" smtClean="0">
+                              <a:latin typeface="Cambria Math"/>
+                              <a:ea typeface="Cambria Math"/>
+                            </a:rPr>
+                          </m:ctrlPr>
+                        </m:sSubPr>
+                        <m:e>
+                          <m:r>
+                            <a:rPr lang="en-US" sz="1400" i="1" smtClean="0">
+                              <a:latin typeface="Cambria Math"/>
+                              <a:ea typeface="Cambria Math"/>
+                            </a:rPr>
+                            <m:t>𝜔</m:t>
+                          </m:r>
+                        </m:e>
+                        <m:sub>
+                          <m:r>
+                            <a:rPr lang="en-US" sz="1400" b="0" i="1" smtClean="0">
+                              <a:latin typeface="Cambria Math"/>
+                              <a:ea typeface="Cambria Math"/>
+                            </a:rPr>
+                            <m:t>𝑡</m:t>
+                          </m:r>
+                        </m:sub>
+                      </m:sSub>
+                    </m:oMath>
+                  </m:oMathPara>
+                </a14:m>
+                <a:endParaRPr lang="en-US" sz="1400" dirty="0" smtClean="0"/>
+              </a:p>
+            </p:txBody>
+          </p:sp>
+        </mc:Choice>
+        <mc:Fallback>
+          <p:sp>
+            <p:nvSpPr>
+              <p:cNvPr id="72" name="TextBox 71"/>
+              <p:cNvSpPr txBox="1">
+                <a:spLocks noRot="1" noChangeAspect="1" noMove="1" noResize="1" noEditPoints="1" noAdjustHandles="1" noChangeArrowheads="1" noChangeShapeType="1" noTextEdit="1"/>
+              </p:cNvSpPr>
+              <p:nvPr/>
+            </p:nvSpPr>
+            <p:spPr>
+              <a:xfrm>
+                <a:off x="388098" y="1860987"/>
+                <a:ext cx="869222" cy="307777"/>
+              </a:xfrm>
+              <a:prstGeom prst="rect">
+                <a:avLst/>
+              </a:prstGeom>
+              <a:blipFill rotWithShape="1">
+                <a:blip r:embed="rId14"/>
+                <a:stretch>
+                  <a:fillRect/>
+                </a:stretch>
+              </a:blipFill>
+            </p:spPr>
+            <p:txBody>
+              <a:bodyPr/>
+              <a:lstStyle/>
+              <a:p>
+                <a:r>
+                  <a:rPr lang="en-US">
+                    <a:noFill/>
+                  </a:rPr>
+                  <a:t> </a:t>
+                </a:r>
+              </a:p>
+            </p:txBody>
+          </p:sp>
+        </mc:Fallback>
+      </mc:AlternateContent>
+      <p:cxnSp>
+        <p:nvCxnSpPr>
+          <p:cNvPr id="74" name="Elbow Connector 44"/>
+          <p:cNvCxnSpPr/>
+          <p:nvPr/>
+        </p:nvCxnSpPr>
+        <p:spPr>
+          <a:xfrm rot="10800000">
+            <a:off x="1981200" y="2048489"/>
+            <a:ext cx="6355262" cy="936498"/>
           </a:xfrm>
           <a:prstGeom prst="bentConnector3">
             <a:avLst>
-              <a:gd name="adj1" fmla="val 121750"/>
+              <a:gd name="adj1" fmla="val -358"/>
             </a:avLst>
           </a:prstGeom>
           <a:ln w="57150">
             <a:headEnd type="none" w="med" len="med"/>
-            <a:tailEnd type="arrow" w="med" len="med"/>
+            <a:tailEnd type="none" w="med" len="med"/>
+          </a:ln>
+        </p:spPr>
+        <p:style>
+          <a:lnRef idx="1">
+            <a:schemeClr val="dk1"/>
+          </a:lnRef>
+          <a:fillRef idx="0">
+            <a:schemeClr val="dk1"/>
+          </a:fillRef>
+          <a:effectRef idx="0">
+            <a:schemeClr val="dk1"/>
+          </a:effectRef>
+          <a:fontRef idx="minor">
+            <a:schemeClr val="tx1"/>
+          </a:fontRef>
+        </p:style>
+      </p:cxnSp>
+      <p:cxnSp>
+        <p:nvCxnSpPr>
+          <p:cNvPr id="77" name="Elbow Connector 44"/>
+          <p:cNvCxnSpPr>
+            <a:stCxn id="18" idx="0"/>
+          </p:cNvCxnSpPr>
+          <p:nvPr/>
+        </p:nvCxnSpPr>
+        <p:spPr>
+          <a:xfrm flipV="1">
+            <a:off x="4627248" y="2058019"/>
+            <a:ext cx="0" cy="413186"/>
+          </a:xfrm>
+          <a:prstGeom prst="straightConnector1">
+            <a:avLst/>
+          </a:prstGeom>
+          <a:ln w="57150">
+            <a:headEnd type="arrow" w="med" len="med"/>
+            <a:tailEnd type="none" w="med" len="med"/>
+          </a:ln>
+        </p:spPr>
+        <p:style>
+          <a:lnRef idx="1">
+            <a:schemeClr val="dk1"/>
+          </a:lnRef>
+          <a:fillRef idx="0">
+            <a:schemeClr val="dk1"/>
+          </a:fillRef>
+          <a:effectRef idx="0">
+            <a:schemeClr val="dk1"/>
+          </a:effectRef>
+          <a:fontRef idx="minor">
+            <a:schemeClr val="tx1"/>
+          </a:fontRef>
+        </p:style>
+      </p:cxnSp>
+      <p:cxnSp>
+        <p:nvCxnSpPr>
+          <p:cNvPr id="47" name="Elbow Connector 44"/>
+          <p:cNvCxnSpPr/>
+          <p:nvPr/>
+        </p:nvCxnSpPr>
+        <p:spPr>
+          <a:xfrm flipV="1">
+            <a:off x="1981200" y="2048489"/>
+            <a:ext cx="0" cy="404751"/>
+          </a:xfrm>
+          <a:prstGeom prst="straightConnector1">
+            <a:avLst/>
+          </a:prstGeom>
+          <a:ln w="57150">
+            <a:headEnd type="arrow" w="med" len="med"/>
+            <a:tailEnd type="none" w="med" len="med"/>
           </a:ln>
         </p:spPr>
         <p:style>

</xml_diff>

<commit_message>
Update pdf and block diagram. Need to reformat to documentation standards
</commit_message>
<xml_diff>
--- a/Block_Diagram.pptx
+++ b/Block_Diagram.pptx
@@ -290,7 +290,7 @@
           <a:p>
             <a:fld id="{5CFEE199-47E7-4EA7-AFBD-8A4F6CCA5D88}" type="datetimeFigureOut">
               <a:rPr lang="en-US" smtClean="0"/>
-              <a:t>10/16/2014</a:t>
+              <a:t>10/17/2014</a:t>
             </a:fld>
             <a:endParaRPr lang="en-US"/>
           </a:p>
@@ -460,7 +460,7 @@
           <a:p>
             <a:fld id="{5CFEE199-47E7-4EA7-AFBD-8A4F6CCA5D88}" type="datetimeFigureOut">
               <a:rPr lang="en-US" smtClean="0"/>
-              <a:t>10/16/2014</a:t>
+              <a:t>10/17/2014</a:t>
             </a:fld>
             <a:endParaRPr lang="en-US"/>
           </a:p>
@@ -640,7 +640,7 @@
           <a:p>
             <a:fld id="{5CFEE199-47E7-4EA7-AFBD-8A4F6CCA5D88}" type="datetimeFigureOut">
               <a:rPr lang="en-US" smtClean="0"/>
-              <a:t>10/16/2014</a:t>
+              <a:t>10/17/2014</a:t>
             </a:fld>
             <a:endParaRPr lang="en-US"/>
           </a:p>
@@ -810,7 +810,7 @@
           <a:p>
             <a:fld id="{5CFEE199-47E7-4EA7-AFBD-8A4F6CCA5D88}" type="datetimeFigureOut">
               <a:rPr lang="en-US" smtClean="0"/>
-              <a:t>10/16/2014</a:t>
+              <a:t>10/17/2014</a:t>
             </a:fld>
             <a:endParaRPr lang="en-US"/>
           </a:p>
@@ -1056,7 +1056,7 @@
           <a:p>
             <a:fld id="{5CFEE199-47E7-4EA7-AFBD-8A4F6CCA5D88}" type="datetimeFigureOut">
               <a:rPr lang="en-US" smtClean="0"/>
-              <a:t>10/16/2014</a:t>
+              <a:t>10/17/2014</a:t>
             </a:fld>
             <a:endParaRPr lang="en-US"/>
           </a:p>
@@ -1344,7 +1344,7 @@
           <a:p>
             <a:fld id="{5CFEE199-47E7-4EA7-AFBD-8A4F6CCA5D88}" type="datetimeFigureOut">
               <a:rPr lang="en-US" smtClean="0"/>
-              <a:t>10/16/2014</a:t>
+              <a:t>10/17/2014</a:t>
             </a:fld>
             <a:endParaRPr lang="en-US"/>
           </a:p>
@@ -1766,7 +1766,7 @@
           <a:p>
             <a:fld id="{5CFEE199-47E7-4EA7-AFBD-8A4F6CCA5D88}" type="datetimeFigureOut">
               <a:rPr lang="en-US" smtClean="0"/>
-              <a:t>10/16/2014</a:t>
+              <a:t>10/17/2014</a:t>
             </a:fld>
             <a:endParaRPr lang="en-US"/>
           </a:p>
@@ -1884,7 +1884,7 @@
           <a:p>
             <a:fld id="{5CFEE199-47E7-4EA7-AFBD-8A4F6CCA5D88}" type="datetimeFigureOut">
               <a:rPr lang="en-US" smtClean="0"/>
-              <a:t>10/16/2014</a:t>
+              <a:t>10/17/2014</a:t>
             </a:fld>
             <a:endParaRPr lang="en-US"/>
           </a:p>
@@ -1979,7 +1979,7 @@
           <a:p>
             <a:fld id="{5CFEE199-47E7-4EA7-AFBD-8A4F6CCA5D88}" type="datetimeFigureOut">
               <a:rPr lang="en-US" smtClean="0"/>
-              <a:t>10/16/2014</a:t>
+              <a:t>10/17/2014</a:t>
             </a:fld>
             <a:endParaRPr lang="en-US"/>
           </a:p>
@@ -2256,7 +2256,7 @@
           <a:p>
             <a:fld id="{5CFEE199-47E7-4EA7-AFBD-8A4F6CCA5D88}" type="datetimeFigureOut">
               <a:rPr lang="en-US" smtClean="0"/>
-              <a:t>10/16/2014</a:t>
+              <a:t>10/17/2014</a:t>
             </a:fld>
             <a:endParaRPr lang="en-US"/>
           </a:p>
@@ -2509,7 +2509,7 @@
           <a:p>
             <a:fld id="{5CFEE199-47E7-4EA7-AFBD-8A4F6CCA5D88}" type="datetimeFigureOut">
               <a:rPr lang="en-US" smtClean="0"/>
-              <a:t>10/16/2014</a:t>
+              <a:t>10/17/2014</a:t>
             </a:fld>
             <a:endParaRPr lang="en-US"/>
           </a:p>
@@ -2722,7 +2722,7 @@
           <a:p>
             <a:fld id="{5CFEE199-47E7-4EA7-AFBD-8A4F6CCA5D88}" type="datetimeFigureOut">
               <a:rPr lang="en-US" smtClean="0"/>
-              <a:t>10/16/2014</a:t>
+              <a:t>10/17/2014</a:t>
             </a:fld>
             <a:endParaRPr lang="en-US"/>
           </a:p>
@@ -5519,8 +5519,8 @@
           </a:p>
         </p:txBody>
       </p:sp>
-      <mc:AlternateContent xmlns:mc="http://schemas.openxmlformats.org/markup-compatibility/2006">
-        <mc:Choice xmlns:a14="http://schemas.microsoft.com/office/drawing/2010/main" Requires="a14">
+      <mc:AlternateContent xmlns:mc="http://schemas.openxmlformats.org/markup-compatibility/2006" xmlns:a14="http://schemas.microsoft.com/office/drawing/2010/main">
+        <mc:Choice Requires="a14">
           <p:sp>
             <p:nvSpPr>
               <p:cNvPr id="16" name="TextBox 15"/>
@@ -5563,7 +5563,7 @@
             </p:txBody>
           </p:sp>
         </mc:Choice>
-        <mc:Fallback>
+        <mc:Fallback xmlns="">
           <p:sp>
             <p:nvSpPr>
               <p:cNvPr id="16" name="TextBox 15"/>
@@ -6129,8 +6129,8 @@
           </a:p>
         </p:txBody>
       </p:sp>
-      <mc:AlternateContent xmlns:mc="http://schemas.openxmlformats.org/markup-compatibility/2006">
-        <mc:Choice xmlns:a14="http://schemas.microsoft.com/office/drawing/2010/main" Requires="a14">
+      <mc:AlternateContent xmlns:mc="http://schemas.openxmlformats.org/markup-compatibility/2006" xmlns:a14="http://schemas.microsoft.com/office/drawing/2010/main">
+        <mc:Choice Requires="a14">
           <p:sp>
             <p:nvSpPr>
               <p:cNvPr id="109" name="TextBox 108"/>
@@ -6193,7 +6193,7 @@
             </p:txBody>
           </p:sp>
         </mc:Choice>
-        <mc:Fallback>
+        <mc:Fallback xmlns="">
           <p:sp>
             <p:nvSpPr>
               <p:cNvPr id="109" name="TextBox 108"/>
@@ -6375,7 +6375,7 @@
             <a:pPr algn="ctr"/>
             <a:r>
               <a:rPr lang="en-US" sz="3600" u="sng" dirty="0" smtClean="0"/>
-              <a:t>Chassis</a:t>
+              <a:t>Vehicle </a:t>
             </a:r>
             <a:endParaRPr lang="en-US" sz="3600" u="sng" dirty="0"/>
           </a:p>
@@ -7557,8 +7557,8 @@
           </a:fontRef>
         </p:style>
       </p:cxnSp>
-      <mc:AlternateContent xmlns:mc="http://schemas.openxmlformats.org/markup-compatibility/2006">
-        <mc:Choice xmlns:a14="http://schemas.microsoft.com/office/drawing/2010/main" Requires="a14">
+      <mc:AlternateContent xmlns:mc="http://schemas.openxmlformats.org/markup-compatibility/2006" xmlns:a14="http://schemas.microsoft.com/office/drawing/2010/main">
+        <mc:Choice Requires="a14">
           <p:sp>
             <p:nvSpPr>
               <p:cNvPr id="72" name="TextBox 71"/>
@@ -7624,7 +7624,7 @@
             </p:txBody>
           </p:sp>
         </mc:Choice>
-        <mc:Fallback>
+        <mc:Fallback xmlns="">
           <p:sp>
             <p:nvSpPr>
               <p:cNvPr id="72" name="TextBox 71"/>

</xml_diff>